<commit_message>
improve Figure 1 and 2
</commit_message>
<xml_diff>
--- a/Recombination_Figures.pptx
+++ b/Recombination_Figures.pptx
@@ -215,7 +215,7 @@
           <a:p>
             <a:fld id="{95E14D50-A045-4548-8B8A-16074DF10057}" type="datetimeFigureOut">
               <a:rPr lang="en-US" smtClean="0"/>
-              <a:t>5/4/2020</a:t>
+              <a:t>5/11/2020</a:t>
             </a:fld>
             <a:endParaRPr lang="en-US"/>
           </a:p>
@@ -554,7 +554,7 @@
                 <a:ea typeface="+mn-ea"/>
                 <a:cs typeface="+mn-cs"/>
               </a:rPr>
-              <a:t>Figure 1 Mean MLH1 count distributions by strain. A) Strain averages of MLH1 counts per cell. B) Female specific MLH1 count distributions. C) Male specific MLH1 counts per cell</a:t>
+              <a:t>Figure 1 Mean MLH1 count distributions by strain. A) Strain averages of MLH1 counts per cell. B) Female specific MLH1 count distributions. C) Male specific MLH1 counts per cell. Example stained cells are inset</a:t>
             </a:r>
             <a:r>
               <a:rPr lang="en-US" sz="1200" i="1" kern="1200" dirty="0" smtClean="0">
@@ -566,7 +566,192 @@
                 <a:ea typeface="+mn-ea"/>
                 <a:cs typeface="+mn-cs"/>
               </a:rPr>
-              <a:t>. Example stained cells are inset.</a:t>
+              <a:t>.</a:t>
+            </a:r>
+          </a:p>
+          <a:p>
+            <a:pPr marL="0" marR="0" lvl="0" indent="0" algn="l" defTabSz="914400" rtl="0" eaLnBrk="1" fontAlgn="auto" latinLnBrk="0" hangingPunct="1">
+              <a:lnSpc>
+                <a:spcPct val="100000"/>
+              </a:lnSpc>
+              <a:spcBef>
+                <a:spcPts val="0"/>
+              </a:spcBef>
+              <a:spcAft>
+                <a:spcPts val="0"/>
+              </a:spcAft>
+              <a:buClrTx/>
+              <a:buSzTx/>
+              <a:buFontTx/>
+              <a:buNone/>
+              <a:tabLst/>
+              <a:defRPr/>
+            </a:pPr>
+            <a:endParaRPr lang="en-US" sz="1200" i="1" kern="1200" dirty="0" smtClean="0">
+              <a:solidFill>
+                <a:schemeClr val="tx1"/>
+              </a:solidFill>
+              <a:effectLst/>
+              <a:latin typeface="+mn-lt"/>
+              <a:ea typeface="+mn-ea"/>
+              <a:cs typeface="+mn-cs"/>
+            </a:endParaRPr>
+          </a:p>
+          <a:p>
+            <a:pPr marL="0" marR="0" lvl="0" indent="0" algn="l" defTabSz="914400" rtl="0" eaLnBrk="1" fontAlgn="auto" latinLnBrk="0" hangingPunct="1">
+              <a:lnSpc>
+                <a:spcPct val="100000"/>
+              </a:lnSpc>
+              <a:spcBef>
+                <a:spcPts val="0"/>
+              </a:spcBef>
+              <a:spcAft>
+                <a:spcPts val="0"/>
+              </a:spcAft>
+              <a:buClrTx/>
+              <a:buSzTx/>
+              <a:buFontTx/>
+              <a:buNone/>
+              <a:tabLst/>
+              <a:defRPr/>
+            </a:pPr>
+            <a:r>
+              <a:rPr lang="en-US" sz="1200" i="1" kern="1200" dirty="0" smtClean="0">
+                <a:solidFill>
+                  <a:schemeClr val="tx1"/>
+                </a:solidFill>
+                <a:effectLst/>
+                <a:latin typeface="+mn-lt"/>
+                <a:ea typeface="+mn-ea"/>
+                <a:cs typeface="+mn-cs"/>
+              </a:rPr>
+              <a:t>*Circles females, triangle</a:t>
+            </a:r>
+            <a:r>
+              <a:rPr lang="en-US" sz="1200" i="1" kern="1200" baseline="0" dirty="0" smtClean="0">
+                <a:solidFill>
+                  <a:schemeClr val="tx1"/>
+                </a:solidFill>
+                <a:effectLst/>
+                <a:latin typeface="+mn-lt"/>
+                <a:ea typeface="+mn-ea"/>
+                <a:cs typeface="+mn-cs"/>
+              </a:rPr>
+              <a:t> male</a:t>
+            </a:r>
+          </a:p>
+          <a:p>
+            <a:pPr marL="0" marR="0" lvl="0" indent="0" algn="l" defTabSz="914400" rtl="0" eaLnBrk="1" fontAlgn="auto" latinLnBrk="0" hangingPunct="1">
+              <a:lnSpc>
+                <a:spcPct val="100000"/>
+              </a:lnSpc>
+              <a:spcBef>
+                <a:spcPts val="0"/>
+              </a:spcBef>
+              <a:spcAft>
+                <a:spcPts val="0"/>
+              </a:spcAft>
+              <a:buClrTx/>
+              <a:buSzTx/>
+              <a:buFontTx/>
+              <a:buNone/>
+              <a:tabLst/>
+              <a:defRPr/>
+            </a:pPr>
+            <a:r>
+              <a:rPr lang="en-US" sz="1200" i="1" kern="1200" baseline="0" dirty="0" smtClean="0">
+                <a:solidFill>
+                  <a:schemeClr val="tx1"/>
+                </a:solidFill>
+                <a:effectLst/>
+                <a:latin typeface="+mn-lt"/>
+                <a:ea typeface="+mn-ea"/>
+                <a:cs typeface="+mn-cs"/>
+              </a:rPr>
+              <a:t>*Mus -  M.   </a:t>
+            </a:r>
+            <a:r>
+              <a:rPr lang="en-US" sz="1200" i="1" kern="1200" baseline="0" dirty="0" err="1" smtClean="0">
+                <a:solidFill>
+                  <a:schemeClr val="tx1"/>
+                </a:solidFill>
+                <a:effectLst/>
+                <a:latin typeface="+mn-lt"/>
+                <a:ea typeface="+mn-ea"/>
+                <a:cs typeface="+mn-cs"/>
+              </a:rPr>
+              <a:t>Spicilegus</a:t>
+            </a:r>
+            <a:r>
+              <a:rPr lang="en-US" sz="1200" i="1" kern="1200" baseline="0" dirty="0" smtClean="0">
+                <a:solidFill>
+                  <a:schemeClr val="tx1"/>
+                </a:solidFill>
+                <a:effectLst/>
+                <a:latin typeface="+mn-lt"/>
+                <a:ea typeface="+mn-ea"/>
+                <a:cs typeface="+mn-cs"/>
+              </a:rPr>
+              <a:t>!!! Spell check</a:t>
+            </a:r>
+          </a:p>
+          <a:p>
+            <a:pPr marL="0" marR="0" lvl="0" indent="0" algn="l" defTabSz="914400" rtl="0" eaLnBrk="1" fontAlgn="auto" latinLnBrk="0" hangingPunct="1">
+              <a:lnSpc>
+                <a:spcPct val="100000"/>
+              </a:lnSpc>
+              <a:spcBef>
+                <a:spcPts val="0"/>
+              </a:spcBef>
+              <a:spcAft>
+                <a:spcPts val="0"/>
+              </a:spcAft>
+              <a:buClrTx/>
+              <a:buSzTx/>
+              <a:buFontTx/>
+              <a:buNone/>
+              <a:tabLst/>
+              <a:defRPr/>
+            </a:pPr>
+            <a:endParaRPr lang="en-US" sz="1200" i="1" kern="1200" baseline="0" dirty="0" smtClean="0">
+              <a:solidFill>
+                <a:schemeClr val="tx1"/>
+              </a:solidFill>
+              <a:effectLst/>
+              <a:latin typeface="+mn-lt"/>
+              <a:ea typeface="+mn-ea"/>
+              <a:cs typeface="+mn-cs"/>
+            </a:endParaRPr>
+          </a:p>
+          <a:p>
+            <a:pPr marL="0" marR="0" lvl="0" indent="0" algn="l" defTabSz="914400" rtl="0" eaLnBrk="1" fontAlgn="auto" latinLnBrk="0" hangingPunct="1">
+              <a:lnSpc>
+                <a:spcPct val="100000"/>
+              </a:lnSpc>
+              <a:spcBef>
+                <a:spcPts val="0"/>
+              </a:spcBef>
+              <a:spcAft>
+                <a:spcPts val="0"/>
+              </a:spcAft>
+              <a:buClrTx/>
+              <a:buSzTx/>
+              <a:buFontTx/>
+              <a:buNone/>
+              <a:tabLst/>
+              <a:defRPr/>
+            </a:pPr>
+            <a:r>
+              <a:rPr lang="en-US" sz="1200" i="1" kern="1200" baseline="0" dirty="0" smtClean="0">
+                <a:solidFill>
+                  <a:schemeClr val="tx1"/>
+                </a:solidFill>
+                <a:effectLst/>
+                <a:latin typeface="+mn-lt"/>
+                <a:ea typeface="+mn-ea"/>
+                <a:cs typeface="+mn-cs"/>
+              </a:rPr>
+              <a:t>-question of colors – put color names in legend.</a:t>
             </a:r>
             <a:endParaRPr lang="en-US" sz="1200" i="1" kern="1200" dirty="0" smtClean="0">
               <a:solidFill>
@@ -686,7 +871,43 @@
             </a:r>
             <a:r>
               <a:rPr lang="en-US" i="1" dirty="0" smtClean="0"/>
-              <a:t>Distribution of DMC1 counts per cell  by strains.</a:t>
+              <a:t>Distribution of DMC1 counts per cell  by strains</a:t>
+            </a:r>
+            <a:r>
+              <a:rPr lang="en-US" i="1" dirty="0" smtClean="0"/>
+              <a:t>.</a:t>
+            </a:r>
+          </a:p>
+          <a:p>
+            <a:endParaRPr lang="en-US" i="1" dirty="0" smtClean="0"/>
+          </a:p>
+          <a:p>
+            <a:r>
+              <a:rPr lang="en-US" i="1" dirty="0" smtClean="0"/>
+              <a:t>Change the strain names --- to superscript</a:t>
+            </a:r>
+          </a:p>
+          <a:p>
+            <a:endParaRPr lang="en-US" i="1" dirty="0" smtClean="0"/>
+          </a:p>
+          <a:p>
+            <a:r>
+              <a:rPr lang="en-US" i="1" dirty="0" smtClean="0"/>
+              <a:t>Add antibody label to text,</a:t>
+            </a:r>
+            <a:r>
+              <a:rPr lang="en-US" i="1" baseline="0" dirty="0" smtClean="0"/>
+              <a:t>  </a:t>
+            </a:r>
+          </a:p>
+          <a:p>
+            <a:r>
+              <a:rPr lang="en-US" i="1" baseline="0" dirty="0" smtClean="0"/>
+              <a:t>Stage -- </a:t>
+            </a:r>
+            <a:r>
+              <a:rPr lang="en-US" i="1" baseline="0" dirty="0" err="1" smtClean="0"/>
+              <a:t>zygotene</a:t>
             </a:r>
             <a:endParaRPr lang="en-US" i="1" dirty="0"/>
           </a:p>
@@ -774,7 +995,42 @@
           <a:p>
             <a:r>
               <a:rPr lang="en-US" i="1" dirty="0" smtClean="0"/>
-              <a:t>Figure 3 Chromosome Class Proportions. Proportions calculated from pooled single bivalent data by strain.</a:t>
+              <a:t>Figure 3 Chromosome Class Proportions. Proportions calculated from pooled single bivalent data by strain</a:t>
+            </a:r>
+            <a:r>
+              <a:rPr lang="en-US" i="1" dirty="0" smtClean="0"/>
+              <a:t>.</a:t>
+            </a:r>
+          </a:p>
+          <a:p>
+            <a:endParaRPr lang="en-US" i="1" dirty="0" smtClean="0"/>
+          </a:p>
+          <a:p>
+            <a:r>
+              <a:rPr lang="en-US" i="1" dirty="0" smtClean="0"/>
+              <a:t>*change to supplemental figure</a:t>
+            </a:r>
+          </a:p>
+          <a:p>
+            <a:r>
+              <a:rPr lang="en-US" i="1" dirty="0" smtClean="0"/>
+              <a:t>*change strain names!! And subspecies  (</a:t>
+            </a:r>
+            <a:r>
+              <a:rPr lang="en-US" i="1" dirty="0" err="1" smtClean="0"/>
+              <a:t>M.m.</a:t>
+            </a:r>
+            <a:r>
+              <a:rPr lang="en-US" i="1" baseline="0" dirty="0" smtClean="0"/>
+              <a:t> </a:t>
+            </a:r>
+            <a:r>
+              <a:rPr lang="en-US" i="1" baseline="0" dirty="0" err="1" smtClean="0"/>
+              <a:t>musculus</a:t>
+            </a:r>
+            <a:r>
+              <a:rPr lang="en-US" i="1" baseline="0" dirty="0" smtClean="0"/>
+              <a:t>)</a:t>
             </a:r>
             <a:endParaRPr lang="en-US" i="1" dirty="0"/>
           </a:p>
@@ -872,19 +1128,102 @@
               <a:rPr lang="en-US" baseline="0" dirty="0" smtClean="0"/>
               <a:t>A) Mouse averages of short bivalents. B) Mouse averages of total SC area per cell. </a:t>
             </a:r>
-          </a:p>
-          <a:p>
             <a:r>
               <a:rPr lang="en-US" baseline="0" dirty="0" smtClean="0"/>
-              <a:t>C) Example of interpretations for IFD-Foci location. Female plots shown in top triangle, male plots shown in bottom triangle.</a:t>
-            </a:r>
+              <a:t>  (explain outline)</a:t>
+            </a:r>
+            <a:endParaRPr lang="en-US" baseline="0" dirty="0" smtClean="0"/>
+          </a:p>
+          <a:p>
+            <a:endParaRPr lang="en-US" baseline="0" dirty="0" smtClean="0"/>
+          </a:p>
+          <a:p>
+            <a:endParaRPr lang="en-US" baseline="0" dirty="0" smtClean="0"/>
           </a:p>
           <a:p>
             <a:r>
               <a:rPr lang="en-US" baseline="0" dirty="0" smtClean="0"/>
-              <a:t>D) Sex differences in IFD distribution for one strain. Main patterns of sexual dimorphism for IFD distributions.</a:t>
-            </a:r>
-            <a:endParaRPr lang="en-US" dirty="0" smtClean="0"/>
+              <a:t>C</a:t>
+            </a:r>
+            <a:r>
+              <a:rPr lang="en-US" baseline="0" dirty="0" smtClean="0"/>
+              <a:t>) Example of interpretations for IFD-Foci location. Female plots shown in top triangle, male plots shown in bottom triangle</a:t>
+            </a:r>
+            <a:r>
+              <a:rPr lang="en-US" baseline="0" dirty="0" smtClean="0"/>
+              <a:t>.</a:t>
+            </a:r>
+          </a:p>
+          <a:p>
+            <a:endParaRPr lang="en-US" baseline="0" dirty="0" smtClean="0"/>
+          </a:p>
+          <a:p>
+            <a:r>
+              <a:rPr lang="en-US" baseline="0" dirty="0" smtClean="0"/>
+              <a:t>D) Sex differences in IFD distribution for one strain. Main patterns of sexual dimorphism for IFD distributions</a:t>
+            </a:r>
+            <a:r>
+              <a:rPr lang="en-US" baseline="0" dirty="0" smtClean="0"/>
+              <a:t>.</a:t>
+            </a:r>
+          </a:p>
+          <a:p>
+            <a:endParaRPr lang="en-US" baseline="0" dirty="0" smtClean="0"/>
+          </a:p>
+          <a:p>
+            <a:r>
+              <a:rPr lang="en-US" baseline="0" dirty="0" smtClean="0"/>
+              <a:t>Merge – C and D</a:t>
+            </a:r>
+          </a:p>
+          <a:p>
+            <a:endParaRPr lang="en-US" baseline="0" dirty="0" smtClean="0"/>
+          </a:p>
+          <a:p>
+            <a:r>
+              <a:rPr lang="en-US" baseline="0" dirty="0" smtClean="0"/>
+              <a:t>*Foci -&gt; </a:t>
+            </a:r>
+            <a:r>
+              <a:rPr lang="en-US" baseline="0" dirty="0" err="1" smtClean="0"/>
+              <a:t>Foucus</a:t>
+            </a:r>
+            <a:r>
+              <a:rPr lang="en-US" baseline="0" dirty="0" smtClean="0"/>
+              <a:t> </a:t>
+            </a:r>
+          </a:p>
+          <a:p>
+            <a:r>
+              <a:rPr lang="en-US" baseline="0" dirty="0" smtClean="0"/>
+              <a:t>*remove text box</a:t>
+            </a:r>
+          </a:p>
+          <a:p>
+            <a:endParaRPr lang="en-US" baseline="0" dirty="0" smtClean="0"/>
+          </a:p>
+          <a:p>
+            <a:r>
+              <a:rPr lang="en-US" baseline="0" dirty="0" smtClean="0"/>
+              <a:t>0change subspecies names</a:t>
+            </a:r>
+          </a:p>
+          <a:p>
+            <a:pPr marL="228600" indent="-228600">
+              <a:buAutoNum type="alphaUcParenR"/>
+            </a:pPr>
+            <a:r>
+              <a:rPr lang="en-US" baseline="0" dirty="0" smtClean="0"/>
+              <a:t>axis </a:t>
+            </a:r>
+            <a:r>
+              <a:rPr lang="en-US" baseline="0" dirty="0" err="1" smtClean="0"/>
+              <a:t>lable</a:t>
+            </a:r>
+            <a:r>
+              <a:rPr lang="en-US" baseline="0" dirty="0" smtClean="0"/>
+              <a:t> – short bivalents  B) axis ‘total SC’  in legend state mouse mean</a:t>
+            </a:r>
           </a:p>
         </p:txBody>
       </p:sp>
@@ -1040,6 +1379,73 @@
             </a:r>
           </a:p>
           <a:p>
+            <a:endParaRPr lang="en-US" dirty="0" smtClean="0"/>
+          </a:p>
+          <a:p>
+            <a:endParaRPr lang="en-US" dirty="0" smtClean="0"/>
+          </a:p>
+          <a:p>
+            <a:r>
+              <a:rPr lang="en-US" dirty="0" smtClean="0"/>
+              <a:t>--remove this figure</a:t>
+            </a:r>
+            <a:r>
+              <a:rPr lang="en-US" baseline="0" dirty="0" smtClean="0"/>
+              <a:t> // just use A – make a supplemental figure</a:t>
+            </a:r>
+            <a:endParaRPr lang="en-US" dirty="0" smtClean="0"/>
+          </a:p>
+          <a:p>
+            <a:endParaRPr lang="en-US" dirty="0" smtClean="0"/>
+          </a:p>
+          <a:p>
+            <a:r>
+              <a:rPr lang="en-US" dirty="0" smtClean="0"/>
+              <a:t>--Change</a:t>
+            </a:r>
+            <a:r>
+              <a:rPr lang="en-US" baseline="0" dirty="0" smtClean="0"/>
+              <a:t> 1 and 0 to high and low recombining</a:t>
+            </a:r>
+          </a:p>
+          <a:p>
+            <a:endParaRPr lang="en-US" baseline="0" dirty="0" smtClean="0"/>
+          </a:p>
+          <a:p>
+            <a:r>
+              <a:rPr lang="en-US" baseline="0" dirty="0" smtClean="0"/>
+              <a:t>-remove grey background</a:t>
+            </a:r>
+          </a:p>
+          <a:p>
+            <a:endParaRPr lang="en-US" baseline="0" dirty="0" smtClean="0"/>
+          </a:p>
+          <a:p>
+            <a:r>
+              <a:rPr lang="en-US" baseline="0" dirty="0" smtClean="0"/>
+              <a:t>-remove strain legend</a:t>
+            </a:r>
+            <a:endParaRPr lang="en-US" dirty="0" smtClean="0"/>
+          </a:p>
+          <a:p>
+            <a:endParaRPr lang="en-US" dirty="0" smtClean="0"/>
+          </a:p>
+          <a:p>
+            <a:endParaRPr lang="en-US" dirty="0" smtClean="0"/>
+          </a:p>
+          <a:p>
+            <a:r>
+              <a:rPr lang="en-US" dirty="0" smtClean="0"/>
+              <a:t>Q2 – just show traits which </a:t>
+            </a:r>
+            <a:r>
+              <a:rPr lang="en-US" dirty="0" err="1" smtClean="0"/>
+              <a:t>whow</a:t>
+            </a:r>
+            <a:r>
+              <a:rPr lang="en-US" baseline="0" dirty="0" smtClean="0"/>
+              <a:t> pattern</a:t>
+            </a:r>
             <a:endParaRPr lang="en-US" dirty="0"/>
           </a:p>
         </p:txBody>
@@ -1142,7 +1548,69 @@
             </a:r>
             <a:r>
               <a:rPr lang="en-US" baseline="0" dirty="0" smtClean="0"/>
-              <a:t> A) Distributions of IFD-foci position for males. B) Boxplots of IFD, high- and low- recombining strains denoted by 1 and 0 respectively.</a:t>
+              <a:t> A) Distributions of IFD-foci position for males. B) Boxplots of IFD, high- and low- </a:t>
+            </a:r>
+            <a:r>
+              <a:rPr lang="en-US" baseline="0" dirty="0" smtClean="0"/>
+              <a:t>recombining </a:t>
+            </a:r>
+            <a:r>
+              <a:rPr lang="en-US" baseline="0" dirty="0" smtClean="0"/>
+              <a:t>strains denoted by 1 and 0 respectively</a:t>
+            </a:r>
+            <a:r>
+              <a:rPr lang="en-US" baseline="0" dirty="0" smtClean="0"/>
+              <a:t>.</a:t>
+            </a:r>
+          </a:p>
+          <a:p>
+            <a:endParaRPr lang="en-US" baseline="0" dirty="0" smtClean="0"/>
+          </a:p>
+          <a:p>
+            <a:r>
+              <a:rPr lang="en-US" baseline="0" dirty="0" smtClean="0"/>
+              <a:t>“High-recombination”</a:t>
+            </a:r>
+          </a:p>
+          <a:p>
+            <a:endParaRPr lang="en-US" baseline="0" dirty="0" smtClean="0"/>
+          </a:p>
+          <a:p>
+            <a:r>
+              <a:rPr lang="en-US" baseline="0" dirty="0" smtClean="0"/>
+              <a:t>High – longer and consistently longer</a:t>
+            </a:r>
+          </a:p>
+          <a:p>
+            <a:endParaRPr lang="en-US" baseline="0" dirty="0" smtClean="0"/>
+          </a:p>
+          <a:p>
+            <a:r>
+              <a:rPr lang="en-US" baseline="0" dirty="0" smtClean="0"/>
+              <a:t>-add boxes around </a:t>
+            </a:r>
+            <a:r>
+              <a:rPr lang="en-US" baseline="0" smtClean="0"/>
+              <a:t>subspecies columns</a:t>
+            </a:r>
+            <a:endParaRPr lang="en-US" baseline="0" dirty="0" smtClean="0"/>
+          </a:p>
+          <a:p>
+            <a:endParaRPr lang="en-US" baseline="0" dirty="0" smtClean="0"/>
+          </a:p>
+          <a:p>
+            <a:r>
+              <a:rPr lang="en-US" baseline="0" dirty="0" smtClean="0"/>
+              <a:t>Remove B?</a:t>
+            </a:r>
+          </a:p>
+          <a:p>
+            <a:endParaRPr lang="en-US" baseline="0" dirty="0" smtClean="0"/>
+          </a:p>
+          <a:p>
+            <a:r>
+              <a:rPr lang="en-US" baseline="0" dirty="0" smtClean="0"/>
+              <a:t>Add male symbol</a:t>
             </a:r>
             <a:endParaRPr lang="en-US" dirty="0" smtClean="0"/>
           </a:p>
@@ -2179,7 +2647,7 @@
           <a:p>
             <a:fld id="{67F5A191-E175-427B-BCC6-0788F47BD32F}" type="datetimeFigureOut">
               <a:rPr lang="en-US" smtClean="0"/>
-              <a:t>5/4/2020</a:t>
+              <a:t>5/11/2020</a:t>
             </a:fld>
             <a:endParaRPr lang="en-US"/>
           </a:p>
@@ -2349,7 +2817,7 @@
           <a:p>
             <a:fld id="{67F5A191-E175-427B-BCC6-0788F47BD32F}" type="datetimeFigureOut">
               <a:rPr lang="en-US" smtClean="0"/>
-              <a:t>5/4/2020</a:t>
+              <a:t>5/11/2020</a:t>
             </a:fld>
             <a:endParaRPr lang="en-US"/>
           </a:p>
@@ -2529,7 +2997,7 @@
           <a:p>
             <a:fld id="{67F5A191-E175-427B-BCC6-0788F47BD32F}" type="datetimeFigureOut">
               <a:rPr lang="en-US" smtClean="0"/>
-              <a:t>5/4/2020</a:t>
+              <a:t>5/11/2020</a:t>
             </a:fld>
             <a:endParaRPr lang="en-US"/>
           </a:p>
@@ -2699,7 +3167,7 @@
           <a:p>
             <a:fld id="{67F5A191-E175-427B-BCC6-0788F47BD32F}" type="datetimeFigureOut">
               <a:rPr lang="en-US" smtClean="0"/>
-              <a:t>5/4/2020</a:t>
+              <a:t>5/11/2020</a:t>
             </a:fld>
             <a:endParaRPr lang="en-US"/>
           </a:p>
@@ -2945,7 +3413,7 @@
           <a:p>
             <a:fld id="{67F5A191-E175-427B-BCC6-0788F47BD32F}" type="datetimeFigureOut">
               <a:rPr lang="en-US" smtClean="0"/>
-              <a:t>5/4/2020</a:t>
+              <a:t>5/11/2020</a:t>
             </a:fld>
             <a:endParaRPr lang="en-US"/>
           </a:p>
@@ -3177,7 +3645,7 @@
           <a:p>
             <a:fld id="{67F5A191-E175-427B-BCC6-0788F47BD32F}" type="datetimeFigureOut">
               <a:rPr lang="en-US" smtClean="0"/>
-              <a:t>5/4/2020</a:t>
+              <a:t>5/11/2020</a:t>
             </a:fld>
             <a:endParaRPr lang="en-US"/>
           </a:p>
@@ -3544,7 +4012,7 @@
           <a:p>
             <a:fld id="{67F5A191-E175-427B-BCC6-0788F47BD32F}" type="datetimeFigureOut">
               <a:rPr lang="en-US" smtClean="0"/>
-              <a:t>5/4/2020</a:t>
+              <a:t>5/11/2020</a:t>
             </a:fld>
             <a:endParaRPr lang="en-US"/>
           </a:p>
@@ -3662,7 +4130,7 @@
           <a:p>
             <a:fld id="{67F5A191-E175-427B-BCC6-0788F47BD32F}" type="datetimeFigureOut">
               <a:rPr lang="en-US" smtClean="0"/>
-              <a:t>5/4/2020</a:t>
+              <a:t>5/11/2020</a:t>
             </a:fld>
             <a:endParaRPr lang="en-US"/>
           </a:p>
@@ -3757,7 +4225,7 @@
           <a:p>
             <a:fld id="{67F5A191-E175-427B-BCC6-0788F47BD32F}" type="datetimeFigureOut">
               <a:rPr lang="en-US" smtClean="0"/>
-              <a:t>5/4/2020</a:t>
+              <a:t>5/11/2020</a:t>
             </a:fld>
             <a:endParaRPr lang="en-US"/>
           </a:p>
@@ -4034,7 +4502,7 @@
           <a:p>
             <a:fld id="{67F5A191-E175-427B-BCC6-0788F47BD32F}" type="datetimeFigureOut">
               <a:rPr lang="en-US" smtClean="0"/>
-              <a:t>5/4/2020</a:t>
+              <a:t>5/11/2020</a:t>
             </a:fld>
             <a:endParaRPr lang="en-US"/>
           </a:p>
@@ -4287,7 +4755,7 @@
           <a:p>
             <a:fld id="{67F5A191-E175-427B-BCC6-0788F47BD32F}" type="datetimeFigureOut">
               <a:rPr lang="en-US" smtClean="0"/>
-              <a:t>5/4/2020</a:t>
+              <a:t>5/11/2020</a:t>
             </a:fld>
             <a:endParaRPr lang="en-US"/>
           </a:p>
@@ -4500,7 +4968,7 @@
           <a:p>
             <a:fld id="{67F5A191-E175-427B-BCC6-0788F47BD32F}" type="datetimeFigureOut">
               <a:rPr lang="en-US" smtClean="0"/>
-              <a:t>5/4/2020</a:t>
+              <a:t>5/11/2020</a:t>
             </a:fld>
             <a:endParaRPr lang="en-US"/>
           </a:p>
@@ -6653,6 +7121,75 @@
           </a:ln>
         </p:spPr>
       </p:pic>
+      <p:pic>
+        <p:nvPicPr>
+          <p:cNvPr id="3" name="Picture 2"/>
+          <p:cNvPicPr>
+            <a:picLocks noChangeAspect="1"/>
+          </p:cNvPicPr>
+          <p:nvPr/>
+        </p:nvPicPr>
+        <p:blipFill rotWithShape="1">
+          <a:blip r:embed="rId4" cstate="print">
+            <a:extLst>
+              <a:ext uri="{28A0092B-C50C-407E-A947-70E740481C1C}">
+                <a14:useLocalDpi xmlns:a14="http://schemas.microsoft.com/office/drawing/2010/main" val="0"/>
+              </a:ext>
+            </a:extLst>
+          </a:blip>
+          <a:srcRect t="1390"/>
+          <a:stretch/>
+        </p:blipFill>
+        <p:spPr>
+          <a:xfrm>
+            <a:off x="9205380" y="571729"/>
+            <a:ext cx="1106206" cy="1038877"/>
+          </a:xfrm>
+          <a:prstGeom prst="rect">
+            <a:avLst/>
+          </a:prstGeom>
+          <a:ln>
+            <a:solidFill>
+              <a:schemeClr val="tx1"/>
+            </a:solidFill>
+          </a:ln>
+        </p:spPr>
+      </p:pic>
+      <p:pic>
+        <p:nvPicPr>
+          <p:cNvPr id="5" name="Picture 4"/>
+          <p:cNvPicPr>
+            <a:picLocks noChangeAspect="1"/>
+          </p:cNvPicPr>
+          <p:nvPr/>
+        </p:nvPicPr>
+        <p:blipFill>
+          <a:blip r:embed="rId5" cstate="print">
+            <a:extLst>
+              <a:ext uri="{28A0092B-C50C-407E-A947-70E740481C1C}">
+                <a14:useLocalDpi xmlns:a14="http://schemas.microsoft.com/office/drawing/2010/main" val="0"/>
+              </a:ext>
+            </a:extLst>
+          </a:blip>
+          <a:stretch>
+            <a:fillRect/>
+          </a:stretch>
+        </p:blipFill>
+        <p:spPr>
+          <a:xfrm>
+            <a:off x="9205380" y="1947535"/>
+            <a:ext cx="1106206" cy="1024265"/>
+          </a:xfrm>
+          <a:prstGeom prst="rect">
+            <a:avLst/>
+          </a:prstGeom>
+          <a:ln>
+            <a:solidFill>
+              <a:schemeClr val="tx1"/>
+            </a:solidFill>
+          </a:ln>
+        </p:spPr>
+      </p:pic>
     </p:spTree>
     <p:extLst>
       <p:ext uri="{BB962C8B-B14F-4D97-AF65-F5344CB8AC3E}">
@@ -17599,7 +18136,7 @@
           <a:graphicData uri="http://schemas.openxmlformats.org/presentationml/2006/ole">
             <mc:AlternateContent xmlns:mc="http://schemas.openxmlformats.org/markup-compatibility/2006">
               <mc:Choice xmlns:v="urn:schemas-microsoft-com:vml" Requires="v">
-                <p:oleObj spid="_x0000_s2058" name="Worksheet" r:id="rId4" imgW="6772228" imgH="1533552" progId="Excel.Sheet.12">
+                <p:oleObj spid="_x0000_s2062" name="Worksheet" r:id="rId4" imgW="6772228" imgH="1533552" progId="Excel.Sheet.12">
                   <p:embed/>
                 </p:oleObj>
               </mc:Choice>

</xml_diff>

<commit_message>
small notes for finalizing figures
</commit_message>
<xml_diff>
--- a/Recombination_Figures.pptx
+++ b/Recombination_Figures.pptx
@@ -5,17 +5,19 @@
     <p:sldMasterId id="2147483648" r:id="rId1"/>
   </p:sldMasterIdLst>
   <p:notesMasterIdLst>
-    <p:notesMasterId r:id="rId10"/>
+    <p:notesMasterId r:id="rId12"/>
   </p:notesMasterIdLst>
   <p:sldIdLst>
     <p:sldId id="259" r:id="rId2"/>
-    <p:sldId id="260" r:id="rId3"/>
-    <p:sldId id="261" r:id="rId4"/>
-    <p:sldId id="257" r:id="rId5"/>
-    <p:sldId id="265" r:id="rId6"/>
+    <p:sldId id="266" r:id="rId3"/>
+    <p:sldId id="267" r:id="rId4"/>
+    <p:sldId id="260" r:id="rId5"/>
+    <p:sldId id="257" r:id="rId6"/>
     <p:sldId id="258" r:id="rId7"/>
     <p:sldId id="262" r:id="rId8"/>
     <p:sldId id="264" r:id="rId9"/>
+    <p:sldId id="265" r:id="rId10"/>
+    <p:sldId id="261" r:id="rId11"/>
   </p:sldIdLst>
   <p:sldSz cx="12192000" cy="6858000"/>
   <p:notesSz cx="6858000" cy="9144000"/>
@@ -215,7 +217,7 @@
           <a:p>
             <a:fld id="{95E14D50-A045-4548-8B8A-16074DF10057}" type="datetimeFigureOut">
               <a:rPr lang="en-US" smtClean="0"/>
-              <a:t>5/11/2020</a:t>
+              <a:t>5/14/2020</a:t>
             </a:fld>
             <a:endParaRPr lang="en-US"/>
           </a:p>
@@ -554,19 +556,7 @@
                 <a:ea typeface="+mn-ea"/>
                 <a:cs typeface="+mn-cs"/>
               </a:rPr>
-              <a:t>Figure 1 Mean MLH1 count distributions by strain. A) Strain averages of MLH1 counts per cell. B) Female specific MLH1 count distributions. C) Male specific MLH1 counts per cell. Example stained cells are inset</a:t>
-            </a:r>
-            <a:r>
-              <a:rPr lang="en-US" sz="1200" i="1" kern="1200" dirty="0" smtClean="0">
-                <a:solidFill>
-                  <a:schemeClr val="tx1"/>
-                </a:solidFill>
-                <a:effectLst/>
-                <a:latin typeface="+mn-lt"/>
-                <a:ea typeface="+mn-ea"/>
-                <a:cs typeface="+mn-cs"/>
-              </a:rPr>
-              <a:t>.</a:t>
+              <a:t>Figure 1 Mean MLH1 count distributions by strain. A) Strain averages of MLH1 counts per cell. B) Female specific MLH1 count distributions. C) Male specific MLH1 counts per cell. Example stained cells are inset.</a:t>
             </a:r>
           </a:p>
           <a:p>
@@ -792,6 +782,143 @@
     <p:extLst>
       <p:ext uri="{BB962C8B-B14F-4D97-AF65-F5344CB8AC3E}">
         <p14:creationId xmlns:p14="http://schemas.microsoft.com/office/powerpoint/2010/main" val="2518852528"/>
+      </p:ext>
+    </p:extLst>
+  </p:cSld>
+  <p:clrMapOvr>
+    <a:masterClrMapping/>
+  </p:clrMapOvr>
+</p:notes>
+</file>
+
+<file path=ppt/notesSlides/notesSlide10.xml><?xml version="1.0" encoding="utf-8"?>
+<p:notes xmlns:a="http://schemas.openxmlformats.org/drawingml/2006/main" xmlns:r="http://schemas.openxmlformats.org/officeDocument/2006/relationships" xmlns:p="http://schemas.openxmlformats.org/presentationml/2006/main">
+  <p:cSld>
+    <p:spTree>
+      <p:nvGrpSpPr>
+        <p:cNvPr id="1" name=""/>
+        <p:cNvGrpSpPr/>
+        <p:nvPr/>
+      </p:nvGrpSpPr>
+      <p:grpSpPr>
+        <a:xfrm>
+          <a:off x="0" y="0"/>
+          <a:ext cx="0" cy="0"/>
+          <a:chOff x="0" y="0"/>
+          <a:chExt cx="0" cy="0"/>
+        </a:xfrm>
+      </p:grpSpPr>
+      <p:sp>
+        <p:nvSpPr>
+          <p:cNvPr id="2" name="Slide Image Placeholder 1"/>
+          <p:cNvSpPr>
+            <a:spLocks noGrp="1" noRot="1" noChangeAspect="1"/>
+          </p:cNvSpPr>
+          <p:nvPr>
+            <p:ph type="sldImg"/>
+          </p:nvPr>
+        </p:nvSpPr>
+        <p:spPr/>
+      </p:sp>
+      <p:sp>
+        <p:nvSpPr>
+          <p:cNvPr id="3" name="Notes Placeholder 2"/>
+          <p:cNvSpPr>
+            <a:spLocks noGrp="1"/>
+          </p:cNvSpPr>
+          <p:nvPr>
+            <p:ph type="body" idx="1"/>
+          </p:nvPr>
+        </p:nvSpPr>
+        <p:spPr/>
+        <p:txBody>
+          <a:bodyPr/>
+          <a:lstStyle/>
+          <a:p>
+            <a:r>
+              <a:rPr lang="en-US" i="1" dirty="0" smtClean="0"/>
+              <a:t>Figure 3 Chromosome Class Proportions. Proportions calculated from pooled single bivalent data by strain.</a:t>
+            </a:r>
+          </a:p>
+          <a:p>
+            <a:endParaRPr lang="en-US" i="1" dirty="0" smtClean="0"/>
+          </a:p>
+          <a:p>
+            <a:r>
+              <a:rPr lang="en-US" i="1" dirty="0" smtClean="0"/>
+              <a:t>*change to supplemental figure</a:t>
+            </a:r>
+          </a:p>
+          <a:p>
+            <a:r>
+              <a:rPr lang="en-US" i="1" dirty="0" smtClean="0"/>
+              <a:t>*change strain names!! And subspecies  (</a:t>
+            </a:r>
+            <a:r>
+              <a:rPr lang="en-US" i="1" dirty="0" err="1" smtClean="0"/>
+              <a:t>M.m.</a:t>
+            </a:r>
+            <a:r>
+              <a:rPr lang="en-US" i="1" baseline="0" dirty="0" smtClean="0"/>
+              <a:t> </a:t>
+            </a:r>
+            <a:r>
+              <a:rPr lang="en-US" i="1" baseline="0" dirty="0" err="1" smtClean="0"/>
+              <a:t>musculus</a:t>
+            </a:r>
+            <a:r>
+              <a:rPr lang="en-US" i="1" baseline="0" dirty="0" smtClean="0"/>
+              <a:t>)</a:t>
+            </a:r>
+          </a:p>
+          <a:p>
+            <a:endParaRPr lang="en-US" i="1" baseline="0" dirty="0" smtClean="0"/>
+          </a:p>
+          <a:p>
+            <a:r>
+              <a:rPr lang="en-US" i="1" baseline="0" dirty="0" smtClean="0"/>
+              <a:t>SUPPLEMENTAL FIG,</a:t>
+            </a:r>
+          </a:p>
+          <a:p>
+            <a:endParaRPr lang="en-US" i="1" baseline="0" dirty="0" smtClean="0"/>
+          </a:p>
+          <a:p>
+            <a:r>
+              <a:rPr lang="en-US" i="1" baseline="0" dirty="0" smtClean="0"/>
+              <a:t>Adjust sizes</a:t>
+            </a:r>
+            <a:endParaRPr lang="en-US" i="1" dirty="0"/>
+          </a:p>
+        </p:txBody>
+      </p:sp>
+      <p:sp>
+        <p:nvSpPr>
+          <p:cNvPr id="4" name="Slide Number Placeholder 3"/>
+          <p:cNvSpPr>
+            <a:spLocks noGrp="1"/>
+          </p:cNvSpPr>
+          <p:nvPr>
+            <p:ph type="sldNum" sz="quarter" idx="10"/>
+          </p:nvPr>
+        </p:nvSpPr>
+        <p:spPr/>
+        <p:txBody>
+          <a:bodyPr/>
+          <a:lstStyle/>
+          <a:p>
+            <a:fld id="{32B75100-2077-46C3-9CB4-194E5C842A72}" type="slidenum">
+              <a:rPr lang="en-US" smtClean="0"/>
+              <a:t>10</a:t>
+            </a:fld>
+            <a:endParaRPr lang="en-US"/>
+          </a:p>
+        </p:txBody>
+      </p:sp>
+    </p:spTree>
+    <p:extLst>
+      <p:ext uri="{BB962C8B-B14F-4D97-AF65-F5344CB8AC3E}">
+        <p14:creationId xmlns:p14="http://schemas.microsoft.com/office/powerpoint/2010/main" val="3566788196"/>
       </p:ext>
     </p:extLst>
   </p:cSld>
@@ -845,71 +972,38 @@
           <a:bodyPr/>
           <a:lstStyle/>
           <a:p>
-            <a:r>
-              <a:rPr lang="en-US" i="1" dirty="0" smtClean="0"/>
-              <a:t>Figure 2 Male DSB estimates A) Example early </a:t>
-            </a:r>
-            <a:r>
-              <a:rPr lang="en-US" i="1" dirty="0" err="1" smtClean="0"/>
-              <a:t>zygotene</a:t>
-            </a:r>
-            <a:r>
-              <a:rPr lang="en-US" i="1" dirty="0" smtClean="0"/>
-              <a:t> spermatocyte spread, B) Example late </a:t>
-            </a:r>
-            <a:r>
-              <a:rPr lang="en-US" i="1" dirty="0" err="1" smtClean="0"/>
-              <a:t>zygotene</a:t>
-            </a:r>
-            <a:r>
-              <a:rPr lang="en-US" i="1" dirty="0" smtClean="0"/>
-              <a:t> spermatocyte spread. Green foci show DMC1. C)</a:t>
-            </a:r>
-            <a:r>
-              <a:rPr lang="en-US" i="1" baseline="0" dirty="0" smtClean="0"/>
-              <a:t> </a:t>
-            </a:r>
-            <a:r>
-              <a:rPr lang="en-US" i="1" dirty="0" smtClean="0"/>
-              <a:t>Distribution of DMC1 counts per cell  by strains</a:t>
-            </a:r>
-            <a:r>
-              <a:rPr lang="en-US" i="1" dirty="0" smtClean="0"/>
-              <a:t>.</a:t>
-            </a:r>
-          </a:p>
-          <a:p>
-            <a:endParaRPr lang="en-US" i="1" dirty="0" smtClean="0"/>
-          </a:p>
-          <a:p>
-            <a:r>
-              <a:rPr lang="en-US" i="1" dirty="0" smtClean="0"/>
-              <a:t>Change the strain names --- to superscript</a:t>
-            </a:r>
-          </a:p>
-          <a:p>
-            <a:endParaRPr lang="en-US" i="1" dirty="0" smtClean="0"/>
-          </a:p>
-          <a:p>
-            <a:r>
-              <a:rPr lang="en-US" i="1" dirty="0" smtClean="0"/>
-              <a:t>Add antibody label to text,</a:t>
-            </a:r>
-            <a:r>
-              <a:rPr lang="en-US" i="1" baseline="0" dirty="0" smtClean="0"/>
-              <a:t>  </a:t>
-            </a:r>
-          </a:p>
-          <a:p>
-            <a:r>
-              <a:rPr lang="en-US" i="1" baseline="0" dirty="0" smtClean="0"/>
-              <a:t>Stage -- </a:t>
-            </a:r>
-            <a:r>
-              <a:rPr lang="en-US" i="1" baseline="0" dirty="0" err="1" smtClean="0"/>
-              <a:t>zygotene</a:t>
-            </a:r>
-            <a:endParaRPr lang="en-US" i="1" dirty="0"/>
+            <a:pPr marL="0" marR="0" lvl="0" indent="0" algn="l" defTabSz="914400" rtl="0" eaLnBrk="1" fontAlgn="auto" latinLnBrk="0" hangingPunct="1">
+              <a:lnSpc>
+                <a:spcPct val="100000"/>
+              </a:lnSpc>
+              <a:spcBef>
+                <a:spcPts val="0"/>
+              </a:spcBef>
+              <a:spcAft>
+                <a:spcPts val="0"/>
+              </a:spcAft>
+              <a:buClrTx/>
+              <a:buSzTx/>
+              <a:buFontTx/>
+              <a:buNone/>
+              <a:tabLst/>
+              <a:defRPr/>
+            </a:pPr>
+            <a:r>
+              <a:rPr lang="en-US" sz="1200" i="1" kern="1200" dirty="0" smtClean="0">
+                <a:solidFill>
+                  <a:schemeClr val="tx1"/>
+                </a:solidFill>
+                <a:effectLst/>
+                <a:latin typeface="+mn-lt"/>
+                <a:ea typeface="+mn-ea"/>
+                <a:cs typeface="+mn-cs"/>
+              </a:rPr>
+              <a:t>Figure 1 Mean MLH1 count distributions by strain. A) Strain averages of MLH1 counts per cell. B) Female specific MLH1 count distributions. C) Male specific MLH1 counts per cell. Example stained cells are inset.</a:t>
+            </a:r>
+          </a:p>
+          <a:p>
+            <a:endParaRPr lang="en-US" dirty="0"/>
           </a:p>
         </p:txBody>
       </p:sp>
@@ -939,7 +1033,7 @@
     </p:spTree>
     <p:extLst>
       <p:ext uri="{BB962C8B-B14F-4D97-AF65-F5344CB8AC3E}">
-        <p14:creationId xmlns:p14="http://schemas.microsoft.com/office/powerpoint/2010/main" val="1392340131"/>
+        <p14:creationId xmlns:p14="http://schemas.microsoft.com/office/powerpoint/2010/main" val="3208106720"/>
       </p:ext>
     </p:extLst>
   </p:cSld>
@@ -993,46 +1087,54 @@
           <a:bodyPr/>
           <a:lstStyle/>
           <a:p>
+            <a:pPr marL="0" marR="0" lvl="0" indent="0" algn="l" defTabSz="914400" rtl="0" eaLnBrk="1" fontAlgn="auto" latinLnBrk="0" hangingPunct="1">
+              <a:lnSpc>
+                <a:spcPct val="100000"/>
+              </a:lnSpc>
+              <a:spcBef>
+                <a:spcPts val="0"/>
+              </a:spcBef>
+              <a:spcAft>
+                <a:spcPts val="0"/>
+              </a:spcAft>
+              <a:buClrTx/>
+              <a:buSzTx/>
+              <a:buFontTx/>
+              <a:buNone/>
+              <a:tabLst/>
+              <a:defRPr/>
+            </a:pPr>
             <a:r>
               <a:rPr lang="en-US" i="1" dirty="0" smtClean="0"/>
-              <a:t>Figure 3 Chromosome Class Proportions. Proportions calculated from pooled single bivalent data by strain</a:t>
+              <a:t>Figure 2 Male DSB estimates A) Example early </a:t>
+            </a:r>
+            <a:r>
+              <a:rPr lang="en-US" i="1" dirty="0" err="1" smtClean="0"/>
+              <a:t>zygotene</a:t>
             </a:r>
             <a:r>
               <a:rPr lang="en-US" i="1" dirty="0" smtClean="0"/>
-              <a:t>.</a:t>
-            </a:r>
-          </a:p>
-          <a:p>
-            <a:endParaRPr lang="en-US" i="1" dirty="0" smtClean="0"/>
-          </a:p>
-          <a:p>
+              <a:t> spermatocyte spread, B) Example late </a:t>
+            </a:r>
+            <a:r>
+              <a:rPr lang="en-US" i="1" dirty="0" err="1" smtClean="0"/>
+              <a:t>zygotene</a:t>
+            </a:r>
             <a:r>
               <a:rPr lang="en-US" i="1" dirty="0" smtClean="0"/>
-              <a:t>*change to supplemental figure</a:t>
-            </a:r>
-          </a:p>
-          <a:p>
-            <a:r>
-              <a:rPr lang="en-US" i="1" dirty="0" smtClean="0"/>
-              <a:t>*change strain names!! And subspecies  (</a:t>
-            </a:r>
-            <a:r>
-              <a:rPr lang="en-US" i="1" dirty="0" err="1" smtClean="0"/>
-              <a:t>M.m.</a:t>
+              <a:t> spermatocyte spread. Green foci show DMC1. C)</a:t>
             </a:r>
             <a:r>
               <a:rPr lang="en-US" i="1" baseline="0" dirty="0" smtClean="0"/>
               <a:t> </a:t>
             </a:r>
             <a:r>
-              <a:rPr lang="en-US" i="1" baseline="0" dirty="0" err="1" smtClean="0"/>
-              <a:t>musculus</a:t>
-            </a:r>
-            <a:r>
-              <a:rPr lang="en-US" i="1" baseline="0" dirty="0" smtClean="0"/>
-              <a:t>)</a:t>
-            </a:r>
-            <a:endParaRPr lang="en-US" i="1" dirty="0"/>
+              <a:rPr lang="en-US" i="1" dirty="0" smtClean="0"/>
+              <a:t>Distribution of DMC1 counts per cell  by strains.</a:t>
+            </a:r>
+          </a:p>
+          <a:p>
+            <a:endParaRPr lang="en-US" dirty="0"/>
           </a:p>
         </p:txBody>
       </p:sp>
@@ -1062,7 +1164,7 @@
     </p:spTree>
     <p:extLst>
       <p:ext uri="{BB962C8B-B14F-4D97-AF65-F5344CB8AC3E}">
-        <p14:creationId xmlns:p14="http://schemas.microsoft.com/office/powerpoint/2010/main" val="3566788196"/>
+        <p14:creationId xmlns:p14="http://schemas.microsoft.com/office/powerpoint/2010/main" val="414721254"/>
       </p:ext>
     </p:extLst>
   </p:cSld>
@@ -1118,112 +1220,65 @@
           <a:p>
             <a:r>
               <a:rPr lang="en-US" i="1" dirty="0" smtClean="0"/>
-              <a:t>Figure 4 Sex Differences</a:t>
+              <a:t>Figure 2 Male DSB estimates A) Example early </a:t>
+            </a:r>
+            <a:r>
+              <a:rPr lang="en-US" i="1" dirty="0" err="1" smtClean="0"/>
+              <a:t>zygotene</a:t>
+            </a:r>
+            <a:r>
+              <a:rPr lang="en-US" i="1" dirty="0" smtClean="0"/>
+              <a:t> spermatocyte spread, B) Example late </a:t>
+            </a:r>
+            <a:r>
+              <a:rPr lang="en-US" i="1" dirty="0" err="1" smtClean="0"/>
+              <a:t>zygotene</a:t>
+            </a:r>
+            <a:r>
+              <a:rPr lang="en-US" i="1" dirty="0" smtClean="0"/>
+              <a:t> spermatocyte spread. Green foci show DMC1. C)</a:t>
             </a:r>
             <a:r>
               <a:rPr lang="en-US" i="1" baseline="0" dirty="0" smtClean="0"/>
-              <a:t> in meiotic traits </a:t>
-            </a:r>
-            <a:r>
-              <a:rPr lang="en-US" baseline="0" dirty="0" smtClean="0"/>
-              <a:t>A) Mouse averages of short bivalents. B) Mouse averages of total SC area per cell. </a:t>
-            </a:r>
-            <a:r>
-              <a:rPr lang="en-US" baseline="0" dirty="0" smtClean="0"/>
-              <a:t>  (explain outline)</a:t>
-            </a:r>
-            <a:endParaRPr lang="en-US" baseline="0" dirty="0" smtClean="0"/>
-          </a:p>
-          <a:p>
-            <a:endParaRPr lang="en-US" baseline="0" dirty="0" smtClean="0"/>
-          </a:p>
-          <a:p>
-            <a:endParaRPr lang="en-US" baseline="0" dirty="0" smtClean="0"/>
-          </a:p>
-          <a:p>
-            <a:r>
-              <a:rPr lang="en-US" baseline="0" dirty="0" smtClean="0"/>
-              <a:t>C</a:t>
-            </a:r>
-            <a:r>
-              <a:rPr lang="en-US" baseline="0" dirty="0" smtClean="0"/>
-              <a:t>) Example of interpretations for IFD-Foci location. Female plots shown in top triangle, male plots shown in bottom triangle</a:t>
-            </a:r>
-            <a:r>
-              <a:rPr lang="en-US" baseline="0" dirty="0" smtClean="0"/>
-              <a:t>.</a:t>
-            </a:r>
-          </a:p>
-          <a:p>
-            <a:endParaRPr lang="en-US" baseline="0" dirty="0" smtClean="0"/>
-          </a:p>
-          <a:p>
-            <a:r>
-              <a:rPr lang="en-US" baseline="0" dirty="0" smtClean="0"/>
-              <a:t>D) Sex differences in IFD distribution for one strain. Main patterns of sexual dimorphism for IFD distributions</a:t>
-            </a:r>
-            <a:r>
-              <a:rPr lang="en-US" baseline="0" dirty="0" smtClean="0"/>
-              <a:t>.</a:t>
-            </a:r>
-          </a:p>
-          <a:p>
-            <a:endParaRPr lang="en-US" baseline="0" dirty="0" smtClean="0"/>
-          </a:p>
-          <a:p>
-            <a:r>
-              <a:rPr lang="en-US" baseline="0" dirty="0" smtClean="0"/>
-              <a:t>Merge – C and D</a:t>
-            </a:r>
-          </a:p>
-          <a:p>
-            <a:endParaRPr lang="en-US" baseline="0" dirty="0" smtClean="0"/>
-          </a:p>
-          <a:p>
-            <a:r>
-              <a:rPr lang="en-US" baseline="0" dirty="0" smtClean="0"/>
-              <a:t>*Foci -&gt; </a:t>
-            </a:r>
-            <a:r>
-              <a:rPr lang="en-US" baseline="0" dirty="0" err="1" smtClean="0"/>
-              <a:t>Foucus</a:t>
-            </a:r>
-            <a:r>
-              <a:rPr lang="en-US" baseline="0" dirty="0" smtClean="0"/>
               <a:t> </a:t>
             </a:r>
-          </a:p>
-          <a:p>
-            <a:r>
-              <a:rPr lang="en-US" baseline="0" dirty="0" smtClean="0"/>
-              <a:t>*remove text box</a:t>
-            </a:r>
-          </a:p>
-          <a:p>
-            <a:endParaRPr lang="en-US" baseline="0" dirty="0" smtClean="0"/>
-          </a:p>
-          <a:p>
-            <a:r>
-              <a:rPr lang="en-US" baseline="0" dirty="0" smtClean="0"/>
-              <a:t>0change subspecies names</a:t>
-            </a:r>
-          </a:p>
-          <a:p>
-            <a:pPr marL="228600" indent="-228600">
-              <a:buAutoNum type="alphaUcParenR"/>
-            </a:pPr>
-            <a:r>
-              <a:rPr lang="en-US" baseline="0" dirty="0" smtClean="0"/>
-              <a:t>axis </a:t>
-            </a:r>
-            <a:r>
-              <a:rPr lang="en-US" baseline="0" dirty="0" err="1" smtClean="0"/>
-              <a:t>lable</a:t>
-            </a:r>
-            <a:r>
-              <a:rPr lang="en-US" baseline="0" dirty="0" smtClean="0"/>
-              <a:t> – short bivalents  B) axis ‘total SC’  in legend state mouse mean</a:t>
-            </a:r>
+            <a:r>
+              <a:rPr lang="en-US" i="1" dirty="0" smtClean="0"/>
+              <a:t>Distribution of DMC1 counts per cell  by strains.</a:t>
+            </a:r>
+          </a:p>
+          <a:p>
+            <a:endParaRPr lang="en-US" i="1" dirty="0" smtClean="0"/>
+          </a:p>
+          <a:p>
+            <a:r>
+              <a:rPr lang="en-US" i="1" dirty="0" smtClean="0"/>
+              <a:t>Change the strain names --- to superscript</a:t>
+            </a:r>
+          </a:p>
+          <a:p>
+            <a:endParaRPr lang="en-US" i="1" dirty="0" smtClean="0"/>
+          </a:p>
+          <a:p>
+            <a:r>
+              <a:rPr lang="en-US" i="1" dirty="0" smtClean="0"/>
+              <a:t>Add antibody label to text,</a:t>
+            </a:r>
+            <a:r>
+              <a:rPr lang="en-US" i="1" baseline="0" dirty="0" smtClean="0"/>
+              <a:t>  </a:t>
+            </a:r>
+          </a:p>
+          <a:p>
+            <a:r>
+              <a:rPr lang="en-US" i="1" baseline="0" dirty="0" smtClean="0"/>
+              <a:t>Stage -- </a:t>
+            </a:r>
+            <a:r>
+              <a:rPr lang="en-US" i="1" baseline="0" dirty="0" err="1" smtClean="0"/>
+              <a:t>zygotene</a:t>
+            </a:r>
+            <a:endParaRPr lang="en-US" i="1" dirty="0"/>
           </a:p>
         </p:txBody>
       </p:sp>
@@ -1242,7 +1297,7 @@
           <a:bodyPr/>
           <a:lstStyle/>
           <a:p>
-            <a:fld id="{D836B551-2E43-4FFE-9FE2-782B1B7A4E04}" type="slidenum">
+            <a:fld id="{32B75100-2077-46C3-9CB4-194E5C842A72}" type="slidenum">
               <a:rPr lang="en-US" smtClean="0"/>
               <a:t>4</a:t>
             </a:fld>
@@ -1253,7 +1308,7 @@
     </p:spTree>
     <p:extLst>
       <p:ext uri="{BB962C8B-B14F-4D97-AF65-F5344CB8AC3E}">
-        <p14:creationId xmlns:p14="http://schemas.microsoft.com/office/powerpoint/2010/main" val="2934808745"/>
+        <p14:creationId xmlns:p14="http://schemas.microsoft.com/office/powerpoint/2010/main" val="1392340131"/>
       </p:ext>
     </p:extLst>
   </p:cSld>
@@ -1309,144 +1364,124 @@
           <a:p>
             <a:r>
               <a:rPr lang="en-US" i="1" dirty="0" smtClean="0"/>
-              <a:t>Figure 5</a:t>
+              <a:t>Figure 4 Sex Differences</a:t>
             </a:r>
             <a:r>
               <a:rPr lang="en-US" i="1" baseline="0" dirty="0" smtClean="0"/>
-              <a:t> SC length metrics in male mice. </a:t>
+              <a:t> in meiotic traits </a:t>
             </a:r>
             <a:r>
               <a:rPr lang="en-US" baseline="0" dirty="0" smtClean="0"/>
-              <a:t>A) Mouse averages for total SC area per cell. B) Relationship of mean MLH1 counts and mean SC area per mouse. Colors are the same as in A.</a:t>
+              <a:t>A) Mouse averages of short bivalents. B) Mouse averages of total SC area per cell.   (explain outline)</a:t>
             </a:r>
           </a:p>
           <a:p>
             <a:endParaRPr lang="en-US" baseline="0" dirty="0" smtClean="0"/>
           </a:p>
           <a:p>
-            <a:pPr marL="0" marR="0" lvl="0" indent="0" algn="l" defTabSz="914400" rtl="0" eaLnBrk="1" fontAlgn="auto" latinLnBrk="0" hangingPunct="1">
-              <a:lnSpc>
-                <a:spcPct val="100000"/>
-              </a:lnSpc>
-              <a:spcBef>
-                <a:spcPts val="0"/>
-              </a:spcBef>
-              <a:spcAft>
-                <a:spcPts val="0"/>
-              </a:spcAft>
-              <a:buClrTx/>
-              <a:buSzTx/>
-              <a:buFontTx/>
+            <a:endParaRPr lang="en-US" baseline="0" dirty="0" smtClean="0"/>
+          </a:p>
+          <a:p>
+            <a:r>
+              <a:rPr lang="en-US" baseline="0" dirty="0" smtClean="0"/>
+              <a:t>C) Example of interpretations for IFD-Foci location. Female plots shown in top triangle, male plots shown in bottom triangle.</a:t>
+            </a:r>
+          </a:p>
+          <a:p>
+            <a:endParaRPr lang="en-US" baseline="0" dirty="0" smtClean="0"/>
+          </a:p>
+          <a:p>
+            <a:r>
+              <a:rPr lang="en-US" baseline="0" dirty="0" smtClean="0"/>
+              <a:t>D) Sex differences in IFD distribution for one strain. Main patterns of sexual dimorphism for IFD distributions.</a:t>
+            </a:r>
+          </a:p>
+          <a:p>
+            <a:endParaRPr lang="en-US" baseline="0" dirty="0" smtClean="0"/>
+          </a:p>
+          <a:p>
+            <a:r>
+              <a:rPr lang="en-US" baseline="0" dirty="0" smtClean="0"/>
+              <a:t>Merge – C and D</a:t>
+            </a:r>
+          </a:p>
+          <a:p>
+            <a:endParaRPr lang="en-US" baseline="0" dirty="0" smtClean="0"/>
+          </a:p>
+          <a:p>
+            <a:r>
+              <a:rPr lang="en-US" baseline="0" dirty="0" smtClean="0"/>
+              <a:t>*Foci -&gt; </a:t>
+            </a:r>
+            <a:r>
+              <a:rPr lang="en-US" baseline="0" dirty="0" err="1" smtClean="0"/>
+              <a:t>Foucus</a:t>
+            </a:r>
+            <a:r>
+              <a:rPr lang="en-US" baseline="0" dirty="0" smtClean="0"/>
+              <a:t> </a:t>
+            </a:r>
+          </a:p>
+          <a:p>
+            <a:r>
+              <a:rPr lang="en-US" baseline="0" dirty="0" smtClean="0"/>
+              <a:t>*remove text box</a:t>
+            </a:r>
+          </a:p>
+          <a:p>
+            <a:endParaRPr lang="en-US" baseline="0" dirty="0" smtClean="0"/>
+          </a:p>
+          <a:p>
+            <a:r>
+              <a:rPr lang="en-US" baseline="0" dirty="0" smtClean="0"/>
+              <a:t>0change subspecies names</a:t>
+            </a:r>
+          </a:p>
+          <a:p>
+            <a:pPr marL="228600" indent="-228600">
+              <a:buAutoNum type="alphaUcParenR"/>
+            </a:pPr>
+            <a:r>
+              <a:rPr lang="en-US" baseline="0" dirty="0" smtClean="0"/>
+              <a:t>axis </a:t>
+            </a:r>
+            <a:r>
+              <a:rPr lang="en-US" baseline="0" dirty="0" err="1" smtClean="0"/>
+              <a:t>lable</a:t>
+            </a:r>
+            <a:r>
+              <a:rPr lang="en-US" baseline="0" dirty="0" smtClean="0"/>
+              <a:t> – short bivalents  B) axis ‘total SC’  in legend state mouse mean</a:t>
+            </a:r>
+          </a:p>
+          <a:p>
+            <a:pPr marL="228600" indent="-228600">
+              <a:buAutoNum type="alphaUcParenR"/>
+            </a:pPr>
+            <a:endParaRPr lang="en-US" baseline="0" dirty="0" smtClean="0"/>
+          </a:p>
+          <a:p>
+            <a:pPr marL="228600" indent="-228600">
+              <a:buAutoNum type="alphaUcParenR"/>
+            </a:pPr>
+            <a:endParaRPr lang="en-US" baseline="0" dirty="0" smtClean="0"/>
+          </a:p>
+          <a:p>
+            <a:pPr marL="0" indent="0">
               <a:buNone/>
-              <a:tabLst/>
-              <a:defRPr/>
             </a:pPr>
             <a:r>
-              <a:rPr lang="en-US" sz="1200" i="1" kern="1200" dirty="0" smtClean="0">
-                <a:solidFill>
-                  <a:schemeClr val="tx1"/>
-                </a:solidFill>
-                <a:effectLst/>
-                <a:latin typeface="+mn-lt"/>
-                <a:ea typeface="+mn-ea"/>
-                <a:cs typeface="+mn-cs"/>
-              </a:rPr>
-              <a:t>Variation in total SC area per cell across strains and Relationship between total </a:t>
-            </a:r>
-            <a:r>
-              <a:rPr lang="en-US" sz="1200" i="1" kern="1200" dirty="0" err="1" smtClean="0">
-                <a:solidFill>
-                  <a:schemeClr val="tx1"/>
-                </a:solidFill>
-                <a:effectLst/>
-                <a:latin typeface="+mn-lt"/>
-                <a:ea typeface="+mn-ea"/>
-                <a:cs typeface="+mn-cs"/>
-              </a:rPr>
-              <a:t>sc</a:t>
-            </a:r>
-            <a:r>
-              <a:rPr lang="en-US" sz="1200" i="1" kern="1200" dirty="0" smtClean="0">
-                <a:solidFill>
-                  <a:schemeClr val="tx1"/>
-                </a:solidFill>
-                <a:effectLst/>
-                <a:latin typeface="+mn-lt"/>
-                <a:ea typeface="+mn-ea"/>
-                <a:cs typeface="+mn-cs"/>
-              </a:rPr>
-              <a:t> and mean MLH1 count per cell across male mice. A) Mean total SC area per mouse across subspecies and recombination groups. High- and low-recombining groups are indicated by 1 and 0 respectively. (Horizontal lines indicate strain averages for total SC area.)B) Mouse averaged rates of MLH1 and total SC per cell</a:t>
-            </a:r>
-          </a:p>
-          <a:p>
-            <a:endParaRPr lang="en-US" dirty="0" smtClean="0"/>
-          </a:p>
-          <a:p>
-            <a:endParaRPr lang="en-US" dirty="0" smtClean="0"/>
-          </a:p>
-          <a:p>
-            <a:r>
-              <a:rPr lang="en-US" dirty="0" smtClean="0"/>
-              <a:t>--remove this figure</a:t>
-            </a:r>
-            <a:r>
               <a:rPr lang="en-US" baseline="0" dirty="0" smtClean="0"/>
-              <a:t> // just use A – make a supplemental figure</a:t>
-            </a:r>
-            <a:endParaRPr lang="en-US" dirty="0" smtClean="0"/>
-          </a:p>
-          <a:p>
-            <a:endParaRPr lang="en-US" dirty="0" smtClean="0"/>
-          </a:p>
-          <a:p>
-            <a:r>
-              <a:rPr lang="en-US" dirty="0" smtClean="0"/>
-              <a:t>--Change</a:t>
+              <a:t>A-changing the </a:t>
+            </a:r>
+            <a:r>
+              <a:rPr lang="en-US" baseline="0" dirty="0" err="1" smtClean="0"/>
+              <a:t>subsp</a:t>
             </a:r>
             <a:r>
               <a:rPr lang="en-US" baseline="0" dirty="0" smtClean="0"/>
-              <a:t> 1 and 0 to high and low recombining</a:t>
-            </a:r>
-          </a:p>
-          <a:p>
-            <a:endParaRPr lang="en-US" baseline="0" dirty="0" smtClean="0"/>
-          </a:p>
-          <a:p>
-            <a:r>
-              <a:rPr lang="en-US" baseline="0" dirty="0" smtClean="0"/>
-              <a:t>-remove grey background</a:t>
-            </a:r>
-          </a:p>
-          <a:p>
-            <a:endParaRPr lang="en-US" baseline="0" dirty="0" smtClean="0"/>
-          </a:p>
-          <a:p>
-            <a:r>
-              <a:rPr lang="en-US" baseline="0" dirty="0" smtClean="0"/>
-              <a:t>-remove strain legend</a:t>
-            </a:r>
-            <a:endParaRPr lang="en-US" dirty="0" smtClean="0"/>
-          </a:p>
-          <a:p>
-            <a:endParaRPr lang="en-US" dirty="0" smtClean="0"/>
-          </a:p>
-          <a:p>
-            <a:endParaRPr lang="en-US" dirty="0" smtClean="0"/>
-          </a:p>
-          <a:p>
-            <a:r>
-              <a:rPr lang="en-US" dirty="0" smtClean="0"/>
-              <a:t>Q2 – just show traits which </a:t>
-            </a:r>
-            <a:r>
-              <a:rPr lang="en-US" dirty="0" err="1" smtClean="0"/>
-              <a:t>whow</a:t>
-            </a:r>
-            <a:r>
-              <a:rPr lang="en-US" baseline="0" dirty="0" smtClean="0"/>
-              <a:t> pattern</a:t>
-            </a:r>
-            <a:endParaRPr lang="en-US" dirty="0"/>
+              <a:t> to italic is too hard</a:t>
+            </a:r>
           </a:p>
         </p:txBody>
       </p:sp>
@@ -1465,7 +1500,7 @@
           <a:bodyPr/>
           <a:lstStyle/>
           <a:p>
-            <a:fld id="{32B75100-2077-46C3-9CB4-194E5C842A72}" type="slidenum">
+            <a:fld id="{D836B551-2E43-4FFE-9FE2-782B1B7A4E04}" type="slidenum">
               <a:rPr lang="en-US" smtClean="0"/>
               <a:t>5</a:t>
             </a:fld>
@@ -1476,7 +1511,7 @@
     </p:spTree>
     <p:extLst>
       <p:ext uri="{BB962C8B-B14F-4D97-AF65-F5344CB8AC3E}">
-        <p14:creationId xmlns:p14="http://schemas.microsoft.com/office/powerpoint/2010/main" val="39091528"/>
+        <p14:creationId xmlns:p14="http://schemas.microsoft.com/office/powerpoint/2010/main" val="2934808745"/>
       </p:ext>
     </p:extLst>
   </p:cSld>
@@ -1548,19 +1583,7 @@
             </a:r>
             <a:r>
               <a:rPr lang="en-US" baseline="0" dirty="0" smtClean="0"/>
-              <a:t> A) Distributions of IFD-foci position for males. B) Boxplots of IFD, high- and low- </a:t>
-            </a:r>
-            <a:r>
-              <a:rPr lang="en-US" baseline="0" dirty="0" smtClean="0"/>
-              <a:t>recombining </a:t>
-            </a:r>
-            <a:r>
-              <a:rPr lang="en-US" baseline="0" dirty="0" smtClean="0"/>
-              <a:t>strains denoted by 1 and 0 respectively</a:t>
-            </a:r>
-            <a:r>
-              <a:rPr lang="en-US" baseline="0" dirty="0" smtClean="0"/>
-              <a:t>.</a:t>
+              <a:t> A) Distributions of IFD-foci position for males. B) Boxplots of IFD, high- and low- recombining strains denoted by 1 and 0 respectively.</a:t>
             </a:r>
           </a:p>
           <a:p>
@@ -1587,13 +1610,8 @@
           <a:p>
             <a:r>
               <a:rPr lang="en-US" baseline="0" dirty="0" smtClean="0"/>
-              <a:t>-add boxes around </a:t>
-            </a:r>
-            <a:r>
-              <a:rPr lang="en-US" baseline="0" smtClean="0"/>
-              <a:t>subspecies columns</a:t>
-            </a:r>
-            <a:endParaRPr lang="en-US" baseline="0" dirty="0" smtClean="0"/>
+              <a:t>-add boxes around subspecies columns</a:t>
+            </a:r>
           </a:p>
           <a:p>
             <a:endParaRPr lang="en-US" baseline="0" dirty="0" smtClean="0"/>
@@ -2516,6 +2534,229 @@
 </p:notes>
 </file>
 
+<file path=ppt/notesSlides/notesSlide9.xml><?xml version="1.0" encoding="utf-8"?>
+<p:notes xmlns:a="http://schemas.openxmlformats.org/drawingml/2006/main" xmlns:r="http://schemas.openxmlformats.org/officeDocument/2006/relationships" xmlns:p="http://schemas.openxmlformats.org/presentationml/2006/main">
+  <p:cSld>
+    <p:spTree>
+      <p:nvGrpSpPr>
+        <p:cNvPr id="1" name=""/>
+        <p:cNvGrpSpPr/>
+        <p:nvPr/>
+      </p:nvGrpSpPr>
+      <p:grpSpPr>
+        <a:xfrm>
+          <a:off x="0" y="0"/>
+          <a:ext cx="0" cy="0"/>
+          <a:chOff x="0" y="0"/>
+          <a:chExt cx="0" cy="0"/>
+        </a:xfrm>
+      </p:grpSpPr>
+      <p:sp>
+        <p:nvSpPr>
+          <p:cNvPr id="2" name="Slide Image Placeholder 1"/>
+          <p:cNvSpPr>
+            <a:spLocks noGrp="1" noRot="1" noChangeAspect="1"/>
+          </p:cNvSpPr>
+          <p:nvPr>
+            <p:ph type="sldImg"/>
+          </p:nvPr>
+        </p:nvSpPr>
+        <p:spPr/>
+      </p:sp>
+      <p:sp>
+        <p:nvSpPr>
+          <p:cNvPr id="3" name="Notes Placeholder 2"/>
+          <p:cNvSpPr>
+            <a:spLocks noGrp="1"/>
+          </p:cNvSpPr>
+          <p:nvPr>
+            <p:ph type="body" idx="1"/>
+          </p:nvPr>
+        </p:nvSpPr>
+        <p:spPr/>
+        <p:txBody>
+          <a:bodyPr/>
+          <a:lstStyle/>
+          <a:p>
+            <a:r>
+              <a:rPr lang="en-US" i="1" dirty="0" smtClean="0"/>
+              <a:t>Figure 5</a:t>
+            </a:r>
+            <a:r>
+              <a:rPr lang="en-US" i="1" baseline="0" dirty="0" smtClean="0"/>
+              <a:t> SC length metrics in male mice. </a:t>
+            </a:r>
+            <a:r>
+              <a:rPr lang="en-US" baseline="0" dirty="0" smtClean="0"/>
+              <a:t>A) Mouse averages for total SC area per cell. B) Relationship of mean MLH1 counts and mean SC area per mouse. Colors are the same as in A.</a:t>
+            </a:r>
+          </a:p>
+          <a:p>
+            <a:endParaRPr lang="en-US" baseline="0" dirty="0" smtClean="0"/>
+          </a:p>
+          <a:p>
+            <a:pPr marL="0" marR="0" lvl="0" indent="0" algn="l" defTabSz="914400" rtl="0" eaLnBrk="1" fontAlgn="auto" latinLnBrk="0" hangingPunct="1">
+              <a:lnSpc>
+                <a:spcPct val="100000"/>
+              </a:lnSpc>
+              <a:spcBef>
+                <a:spcPts val="0"/>
+              </a:spcBef>
+              <a:spcAft>
+                <a:spcPts val="0"/>
+              </a:spcAft>
+              <a:buClrTx/>
+              <a:buSzTx/>
+              <a:buFontTx/>
+              <a:buNone/>
+              <a:tabLst/>
+              <a:defRPr/>
+            </a:pPr>
+            <a:r>
+              <a:rPr lang="en-US" sz="1200" i="1" kern="1200" dirty="0" smtClean="0">
+                <a:solidFill>
+                  <a:schemeClr val="tx1"/>
+                </a:solidFill>
+                <a:effectLst/>
+                <a:latin typeface="+mn-lt"/>
+                <a:ea typeface="+mn-ea"/>
+                <a:cs typeface="+mn-cs"/>
+              </a:rPr>
+              <a:t>Variation in total SC area per cell across strains and Relationship between total </a:t>
+            </a:r>
+            <a:r>
+              <a:rPr lang="en-US" sz="1200" i="1" kern="1200" dirty="0" err="1" smtClean="0">
+                <a:solidFill>
+                  <a:schemeClr val="tx1"/>
+                </a:solidFill>
+                <a:effectLst/>
+                <a:latin typeface="+mn-lt"/>
+                <a:ea typeface="+mn-ea"/>
+                <a:cs typeface="+mn-cs"/>
+              </a:rPr>
+              <a:t>sc</a:t>
+            </a:r>
+            <a:r>
+              <a:rPr lang="en-US" sz="1200" i="1" kern="1200" dirty="0" smtClean="0">
+                <a:solidFill>
+                  <a:schemeClr val="tx1"/>
+                </a:solidFill>
+                <a:effectLst/>
+                <a:latin typeface="+mn-lt"/>
+                <a:ea typeface="+mn-ea"/>
+                <a:cs typeface="+mn-cs"/>
+              </a:rPr>
+              <a:t> and mean MLH1 count per cell across male mice. A) Mean total SC area per mouse across subspecies and recombination groups. High- and low-recombining groups are indicated by 1 and 0 respectively. (Horizontal lines indicate strain averages for total SC area.)B) Mouse averaged rates of MLH1 and total SC per cell</a:t>
+            </a:r>
+          </a:p>
+          <a:p>
+            <a:endParaRPr lang="en-US" dirty="0" smtClean="0"/>
+          </a:p>
+          <a:p>
+            <a:endParaRPr lang="en-US" dirty="0" smtClean="0"/>
+          </a:p>
+          <a:p>
+            <a:r>
+              <a:rPr lang="en-US" dirty="0" smtClean="0"/>
+              <a:t>--remove this figure</a:t>
+            </a:r>
+            <a:r>
+              <a:rPr lang="en-US" baseline="0" dirty="0" smtClean="0"/>
+              <a:t> // just use A – make a supplemental figure</a:t>
+            </a:r>
+            <a:endParaRPr lang="en-US" dirty="0" smtClean="0"/>
+          </a:p>
+          <a:p>
+            <a:endParaRPr lang="en-US" dirty="0" smtClean="0"/>
+          </a:p>
+          <a:p>
+            <a:r>
+              <a:rPr lang="en-US" dirty="0" smtClean="0"/>
+              <a:t>--Change</a:t>
+            </a:r>
+            <a:r>
+              <a:rPr lang="en-US" baseline="0" dirty="0" smtClean="0"/>
+              <a:t> 1 and 0 to high and low recombining</a:t>
+            </a:r>
+          </a:p>
+          <a:p>
+            <a:endParaRPr lang="en-US" baseline="0" dirty="0" smtClean="0"/>
+          </a:p>
+          <a:p>
+            <a:r>
+              <a:rPr lang="en-US" baseline="0" dirty="0" smtClean="0"/>
+              <a:t>-remove grey background</a:t>
+            </a:r>
+          </a:p>
+          <a:p>
+            <a:endParaRPr lang="en-US" baseline="0" dirty="0" smtClean="0"/>
+          </a:p>
+          <a:p>
+            <a:r>
+              <a:rPr lang="en-US" baseline="0" dirty="0" smtClean="0"/>
+              <a:t>-remove strain legend</a:t>
+            </a:r>
+            <a:endParaRPr lang="en-US" dirty="0" smtClean="0"/>
+          </a:p>
+          <a:p>
+            <a:endParaRPr lang="en-US" dirty="0" smtClean="0"/>
+          </a:p>
+          <a:p>
+            <a:endParaRPr lang="en-US" dirty="0" smtClean="0"/>
+          </a:p>
+          <a:p>
+            <a:r>
+              <a:rPr lang="en-US" dirty="0" smtClean="0"/>
+              <a:t>Q2 – just show traits which </a:t>
+            </a:r>
+            <a:r>
+              <a:rPr lang="en-US" dirty="0" err="1" smtClean="0"/>
+              <a:t>whow</a:t>
+            </a:r>
+            <a:r>
+              <a:rPr lang="en-US" baseline="0" dirty="0" smtClean="0"/>
+              <a:t> pattern</a:t>
+            </a:r>
+            <a:endParaRPr lang="en-US" dirty="0"/>
+          </a:p>
+        </p:txBody>
+      </p:sp>
+      <p:sp>
+        <p:nvSpPr>
+          <p:cNvPr id="4" name="Slide Number Placeholder 3"/>
+          <p:cNvSpPr>
+            <a:spLocks noGrp="1"/>
+          </p:cNvSpPr>
+          <p:nvPr>
+            <p:ph type="sldNum" sz="quarter" idx="10"/>
+          </p:nvPr>
+        </p:nvSpPr>
+        <p:spPr/>
+        <p:txBody>
+          <a:bodyPr/>
+          <a:lstStyle/>
+          <a:p>
+            <a:fld id="{32B75100-2077-46C3-9CB4-194E5C842A72}" type="slidenum">
+              <a:rPr lang="en-US" smtClean="0"/>
+              <a:t>9</a:t>
+            </a:fld>
+            <a:endParaRPr lang="en-US"/>
+          </a:p>
+        </p:txBody>
+      </p:sp>
+    </p:spTree>
+    <p:extLst>
+      <p:ext uri="{BB962C8B-B14F-4D97-AF65-F5344CB8AC3E}">
+        <p14:creationId xmlns:p14="http://schemas.microsoft.com/office/powerpoint/2010/main" val="39091528"/>
+      </p:ext>
+    </p:extLst>
+  </p:cSld>
+  <p:clrMapOvr>
+    <a:masterClrMapping/>
+  </p:clrMapOvr>
+</p:notes>
+</file>
+
 <file path=ppt/slideLayouts/slideLayout1.xml><?xml version="1.0" encoding="utf-8"?>
 <p:sldLayout xmlns:a="http://schemas.openxmlformats.org/drawingml/2006/main" xmlns:r="http://schemas.openxmlformats.org/officeDocument/2006/relationships" xmlns:p="http://schemas.openxmlformats.org/presentationml/2006/main" type="title" preserve="1">
   <p:cSld name="Title Slide">
@@ -2647,7 +2888,7 @@
           <a:p>
             <a:fld id="{67F5A191-E175-427B-BCC6-0788F47BD32F}" type="datetimeFigureOut">
               <a:rPr lang="en-US" smtClean="0"/>
-              <a:t>5/11/2020</a:t>
+              <a:t>5/14/2020</a:t>
             </a:fld>
             <a:endParaRPr lang="en-US"/>
           </a:p>
@@ -2817,7 +3058,7 @@
           <a:p>
             <a:fld id="{67F5A191-E175-427B-BCC6-0788F47BD32F}" type="datetimeFigureOut">
               <a:rPr lang="en-US" smtClean="0"/>
-              <a:t>5/11/2020</a:t>
+              <a:t>5/14/2020</a:t>
             </a:fld>
             <a:endParaRPr lang="en-US"/>
           </a:p>
@@ -2997,7 +3238,7 @@
           <a:p>
             <a:fld id="{67F5A191-E175-427B-BCC6-0788F47BD32F}" type="datetimeFigureOut">
               <a:rPr lang="en-US" smtClean="0"/>
-              <a:t>5/11/2020</a:t>
+              <a:t>5/14/2020</a:t>
             </a:fld>
             <a:endParaRPr lang="en-US"/>
           </a:p>
@@ -3167,7 +3408,7 @@
           <a:p>
             <a:fld id="{67F5A191-E175-427B-BCC6-0788F47BD32F}" type="datetimeFigureOut">
               <a:rPr lang="en-US" smtClean="0"/>
-              <a:t>5/11/2020</a:t>
+              <a:t>5/14/2020</a:t>
             </a:fld>
             <a:endParaRPr lang="en-US"/>
           </a:p>
@@ -3413,7 +3654,7 @@
           <a:p>
             <a:fld id="{67F5A191-E175-427B-BCC6-0788F47BD32F}" type="datetimeFigureOut">
               <a:rPr lang="en-US" smtClean="0"/>
-              <a:t>5/11/2020</a:t>
+              <a:t>5/14/2020</a:t>
             </a:fld>
             <a:endParaRPr lang="en-US"/>
           </a:p>
@@ -3645,7 +3886,7 @@
           <a:p>
             <a:fld id="{67F5A191-E175-427B-BCC6-0788F47BD32F}" type="datetimeFigureOut">
               <a:rPr lang="en-US" smtClean="0"/>
-              <a:t>5/11/2020</a:t>
+              <a:t>5/14/2020</a:t>
             </a:fld>
             <a:endParaRPr lang="en-US"/>
           </a:p>
@@ -4012,7 +4253,7 @@
           <a:p>
             <a:fld id="{67F5A191-E175-427B-BCC6-0788F47BD32F}" type="datetimeFigureOut">
               <a:rPr lang="en-US" smtClean="0"/>
-              <a:t>5/11/2020</a:t>
+              <a:t>5/14/2020</a:t>
             </a:fld>
             <a:endParaRPr lang="en-US"/>
           </a:p>
@@ -4130,7 +4371,7 @@
           <a:p>
             <a:fld id="{67F5A191-E175-427B-BCC6-0788F47BD32F}" type="datetimeFigureOut">
               <a:rPr lang="en-US" smtClean="0"/>
-              <a:t>5/11/2020</a:t>
+              <a:t>5/14/2020</a:t>
             </a:fld>
             <a:endParaRPr lang="en-US"/>
           </a:p>
@@ -4225,7 +4466,7 @@
           <a:p>
             <a:fld id="{67F5A191-E175-427B-BCC6-0788F47BD32F}" type="datetimeFigureOut">
               <a:rPr lang="en-US" smtClean="0"/>
-              <a:t>5/11/2020</a:t>
+              <a:t>5/14/2020</a:t>
             </a:fld>
             <a:endParaRPr lang="en-US"/>
           </a:p>
@@ -4502,7 +4743,7 @@
           <a:p>
             <a:fld id="{67F5A191-E175-427B-BCC6-0788F47BD32F}" type="datetimeFigureOut">
               <a:rPr lang="en-US" smtClean="0"/>
-              <a:t>5/11/2020</a:t>
+              <a:t>5/14/2020</a:t>
             </a:fld>
             <a:endParaRPr lang="en-US"/>
           </a:p>
@@ -4755,7 +4996,7 @@
           <a:p>
             <a:fld id="{67F5A191-E175-427B-BCC6-0788F47BD32F}" type="datetimeFigureOut">
               <a:rPr lang="en-US" smtClean="0"/>
-              <a:t>5/11/2020</a:t>
+              <a:t>5/14/2020</a:t>
             </a:fld>
             <a:endParaRPr lang="en-US"/>
           </a:p>
@@ -4968,7 +5209,7 @@
           <a:p>
             <a:fld id="{67F5A191-E175-427B-BCC6-0788F47BD32F}" type="datetimeFigureOut">
               <a:rPr lang="en-US" smtClean="0"/>
-              <a:t>5/11/2020</a:t>
+              <a:t>5/14/2020</a:t>
             </a:fld>
             <a:endParaRPr lang="en-US"/>
           </a:p>
@@ -5671,84 +5912,7 @@
 </p:sld>
 </file>
 
-<file path=ppt/slides/slide2.xml><?xml version="1.0" encoding="utf-8"?>
-<p:sld xmlns:a="http://schemas.openxmlformats.org/drawingml/2006/main" xmlns:r="http://schemas.openxmlformats.org/officeDocument/2006/relationships" xmlns:p="http://schemas.openxmlformats.org/presentationml/2006/main">
-  <p:cSld>
-    <p:spTree>
-      <p:nvGrpSpPr>
-        <p:cNvPr id="1" name=""/>
-        <p:cNvGrpSpPr/>
-        <p:nvPr/>
-      </p:nvGrpSpPr>
-      <p:grpSpPr>
-        <a:xfrm>
-          <a:off x="0" y="0"/>
-          <a:ext cx="0" cy="0"/>
-          <a:chOff x="0" y="0"/>
-          <a:chExt cx="0" cy="0"/>
-        </a:xfrm>
-      </p:grpSpPr>
-      <p:sp>
-        <p:nvSpPr>
-          <p:cNvPr id="2" name="Title 1"/>
-          <p:cNvSpPr>
-            <a:spLocks noGrp="1"/>
-          </p:cNvSpPr>
-          <p:nvPr>
-            <p:ph type="title"/>
-          </p:nvPr>
-        </p:nvSpPr>
-        <p:spPr/>
-        <p:txBody>
-          <a:bodyPr/>
-          <a:lstStyle/>
-          <a:p>
-            <a:endParaRPr lang="en-US"/>
-          </a:p>
-        </p:txBody>
-      </p:sp>
-      <p:pic>
-        <p:nvPicPr>
-          <p:cNvPr id="4" name="Content Placeholder 3"/>
-          <p:cNvPicPr>
-            <a:picLocks noGrp="1" noChangeAspect="1"/>
-          </p:cNvPicPr>
-          <p:nvPr>
-            <p:ph idx="1"/>
-          </p:nvPr>
-        </p:nvPicPr>
-        <p:blipFill rotWithShape="1">
-          <a:blip r:embed="rId3">
-            <a:extLst>
-              <a:ext uri="{28A0092B-C50C-407E-A947-70E740481C1C}">
-                <a14:useLocalDpi xmlns:a14="http://schemas.microsoft.com/office/drawing/2010/main" val="0"/>
-              </a:ext>
-            </a:extLst>
-          </a:blip>
-          <a:srcRect t="13261"/>
-          <a:stretch/>
-        </p:blipFill>
-        <p:spPr>
-          <a:xfrm>
-            <a:off x="591065" y="171628"/>
-            <a:ext cx="9763897" cy="6514743"/>
-          </a:xfrm>
-        </p:spPr>
-      </p:pic>
-    </p:spTree>
-    <p:extLst>
-      <p:ext uri="{BB962C8B-B14F-4D97-AF65-F5344CB8AC3E}">
-        <p14:creationId xmlns:p14="http://schemas.microsoft.com/office/powerpoint/2010/main" val="981457610"/>
-      </p:ext>
-    </p:extLst>
-  </p:cSld>
-  <p:clrMapOvr>
-    <a:masterClrMapping/>
-  </p:clrMapOvr>
-</p:sld>
-</file>
-
-<file path=ppt/slides/slide3.xml><?xml version="1.0" encoding="utf-8"?>
+<file path=ppt/slides/slide10.xml><?xml version="1.0" encoding="utf-8"?>
 <p:sld xmlns:a="http://schemas.openxmlformats.org/drawingml/2006/main" xmlns:r="http://schemas.openxmlformats.org/officeDocument/2006/relationships" xmlns:p="http://schemas.openxmlformats.org/presentationml/2006/main">
   <p:cSld>
     <p:spTree>
@@ -5807,7 +5971,261 @@
 </p:sld>
 </file>
 
+<file path=ppt/slides/slide2.xml><?xml version="1.0" encoding="utf-8"?>
+<p:sld xmlns:a="http://schemas.openxmlformats.org/drawingml/2006/main" xmlns:r="http://schemas.openxmlformats.org/officeDocument/2006/relationships" xmlns:p="http://schemas.openxmlformats.org/presentationml/2006/main">
+  <p:cSld>
+    <p:spTree>
+      <p:nvGrpSpPr>
+        <p:cNvPr id="1" name=""/>
+        <p:cNvGrpSpPr/>
+        <p:nvPr/>
+      </p:nvGrpSpPr>
+      <p:grpSpPr>
+        <a:xfrm>
+          <a:off x="0" y="0"/>
+          <a:ext cx="0" cy="0"/>
+          <a:chOff x="0" y="0"/>
+          <a:chExt cx="0" cy="0"/>
+        </a:xfrm>
+      </p:grpSpPr>
+      <p:sp>
+        <p:nvSpPr>
+          <p:cNvPr id="2" name="Title 1"/>
+          <p:cNvSpPr>
+            <a:spLocks noGrp="1"/>
+          </p:cNvSpPr>
+          <p:nvPr>
+            <p:ph type="title"/>
+          </p:nvPr>
+        </p:nvSpPr>
+        <p:spPr/>
+        <p:txBody>
+          <a:bodyPr/>
+          <a:lstStyle/>
+          <a:p>
+            <a:endParaRPr lang="en-US"/>
+          </a:p>
+        </p:txBody>
+      </p:sp>
+      <p:sp>
+        <p:nvSpPr>
+          <p:cNvPr id="3" name="Content Placeholder 2"/>
+          <p:cNvSpPr>
+            <a:spLocks noGrp="1"/>
+          </p:cNvSpPr>
+          <p:nvPr>
+            <p:ph idx="1"/>
+          </p:nvPr>
+        </p:nvSpPr>
+        <p:spPr/>
+        <p:txBody>
+          <a:bodyPr/>
+          <a:lstStyle/>
+          <a:p>
+            <a:endParaRPr lang="en-US"/>
+          </a:p>
+        </p:txBody>
+      </p:sp>
+      <p:pic>
+        <p:nvPicPr>
+          <p:cNvPr id="4" name="Content Placeholder 3"/>
+          <p:cNvPicPr>
+            <a:picLocks noChangeAspect="1"/>
+          </p:cNvPicPr>
+          <p:nvPr/>
+        </p:nvPicPr>
+        <p:blipFill>
+          <a:blip r:embed="rId3" cstate="print">
+            <a:extLst>
+              <a:ext uri="{28A0092B-C50C-407E-A947-70E740481C1C}">
+                <a14:useLocalDpi xmlns:a14="http://schemas.microsoft.com/office/drawing/2010/main" val="0"/>
+              </a:ext>
+            </a:extLst>
+          </a:blip>
+          <a:stretch>
+            <a:fillRect/>
+          </a:stretch>
+        </p:blipFill>
+        <p:spPr>
+          <a:xfrm>
+            <a:off x="494536" y="499098"/>
+            <a:ext cx="8209197" cy="5859803"/>
+          </a:xfrm>
+          <a:prstGeom prst="rect">
+            <a:avLst/>
+          </a:prstGeom>
+        </p:spPr>
+      </p:pic>
+    </p:spTree>
+    <p:extLst>
+      <p:ext uri="{BB962C8B-B14F-4D97-AF65-F5344CB8AC3E}">
+        <p14:creationId xmlns:p14="http://schemas.microsoft.com/office/powerpoint/2010/main" val="1466112609"/>
+      </p:ext>
+    </p:extLst>
+  </p:cSld>
+  <p:clrMapOvr>
+    <a:masterClrMapping/>
+  </p:clrMapOvr>
+</p:sld>
+</file>
+
+<file path=ppt/slides/slide3.xml><?xml version="1.0" encoding="utf-8"?>
+<p:sld xmlns:a="http://schemas.openxmlformats.org/drawingml/2006/main" xmlns:r="http://schemas.openxmlformats.org/officeDocument/2006/relationships" xmlns:p="http://schemas.openxmlformats.org/presentationml/2006/main">
+  <p:cSld>
+    <p:spTree>
+      <p:nvGrpSpPr>
+        <p:cNvPr id="1" name=""/>
+        <p:cNvGrpSpPr/>
+        <p:nvPr/>
+      </p:nvGrpSpPr>
+      <p:grpSpPr>
+        <a:xfrm>
+          <a:off x="0" y="0"/>
+          <a:ext cx="0" cy="0"/>
+          <a:chOff x="0" y="0"/>
+          <a:chExt cx="0" cy="0"/>
+        </a:xfrm>
+      </p:grpSpPr>
+      <p:sp>
+        <p:nvSpPr>
+          <p:cNvPr id="2" name="Title 1"/>
+          <p:cNvSpPr>
+            <a:spLocks noGrp="1"/>
+          </p:cNvSpPr>
+          <p:nvPr>
+            <p:ph type="title"/>
+          </p:nvPr>
+        </p:nvSpPr>
+        <p:spPr/>
+        <p:txBody>
+          <a:bodyPr/>
+          <a:lstStyle/>
+          <a:p>
+            <a:endParaRPr lang="en-US"/>
+          </a:p>
+        </p:txBody>
+      </p:sp>
+      <p:pic>
+        <p:nvPicPr>
+          <p:cNvPr id="5" name="Picture 4"/>
+          <p:cNvPicPr>
+            <a:picLocks noChangeAspect="1"/>
+          </p:cNvPicPr>
+          <p:nvPr/>
+        </p:nvPicPr>
+        <p:blipFill>
+          <a:blip r:embed="rId3" cstate="print">
+            <a:extLst>
+              <a:ext uri="{28A0092B-C50C-407E-A947-70E740481C1C}">
+                <a14:useLocalDpi xmlns:a14="http://schemas.microsoft.com/office/drawing/2010/main" val="0"/>
+              </a:ext>
+            </a:extLst>
+          </a:blip>
+          <a:stretch>
+            <a:fillRect/>
+          </a:stretch>
+        </p:blipFill>
+        <p:spPr>
+          <a:xfrm>
+            <a:off x="1011206" y="1690688"/>
+            <a:ext cx="4953010" cy="4447041"/>
+          </a:xfrm>
+          <a:prstGeom prst="rect">
+            <a:avLst/>
+          </a:prstGeom>
+        </p:spPr>
+      </p:pic>
+    </p:spTree>
+    <p:extLst>
+      <p:ext uri="{BB962C8B-B14F-4D97-AF65-F5344CB8AC3E}">
+        <p14:creationId xmlns:p14="http://schemas.microsoft.com/office/powerpoint/2010/main" val="2052356588"/>
+      </p:ext>
+    </p:extLst>
+  </p:cSld>
+  <p:clrMapOvr>
+    <a:masterClrMapping/>
+  </p:clrMapOvr>
+</p:sld>
+</file>
+
 <file path=ppt/slides/slide4.xml><?xml version="1.0" encoding="utf-8"?>
+<p:sld xmlns:a="http://schemas.openxmlformats.org/drawingml/2006/main" xmlns:r="http://schemas.openxmlformats.org/officeDocument/2006/relationships" xmlns:p="http://schemas.openxmlformats.org/presentationml/2006/main">
+  <p:cSld>
+    <p:spTree>
+      <p:nvGrpSpPr>
+        <p:cNvPr id="1" name=""/>
+        <p:cNvGrpSpPr/>
+        <p:nvPr/>
+      </p:nvGrpSpPr>
+      <p:grpSpPr>
+        <a:xfrm>
+          <a:off x="0" y="0"/>
+          <a:ext cx="0" cy="0"/>
+          <a:chOff x="0" y="0"/>
+          <a:chExt cx="0" cy="0"/>
+        </a:xfrm>
+      </p:grpSpPr>
+      <p:sp>
+        <p:nvSpPr>
+          <p:cNvPr id="2" name="Title 1"/>
+          <p:cNvSpPr>
+            <a:spLocks noGrp="1"/>
+          </p:cNvSpPr>
+          <p:nvPr>
+            <p:ph type="title"/>
+          </p:nvPr>
+        </p:nvSpPr>
+        <p:spPr/>
+        <p:txBody>
+          <a:bodyPr/>
+          <a:lstStyle/>
+          <a:p>
+            <a:endParaRPr lang="en-US"/>
+          </a:p>
+        </p:txBody>
+      </p:sp>
+      <p:pic>
+        <p:nvPicPr>
+          <p:cNvPr id="4" name="Content Placeholder 3"/>
+          <p:cNvPicPr>
+            <a:picLocks noGrp="1" noChangeAspect="1"/>
+          </p:cNvPicPr>
+          <p:nvPr>
+            <p:ph idx="1"/>
+          </p:nvPr>
+        </p:nvPicPr>
+        <p:blipFill rotWithShape="1">
+          <a:blip r:embed="rId3">
+            <a:extLst>
+              <a:ext uri="{28A0092B-C50C-407E-A947-70E740481C1C}">
+                <a14:useLocalDpi xmlns:a14="http://schemas.microsoft.com/office/drawing/2010/main" val="0"/>
+              </a:ext>
+            </a:extLst>
+          </a:blip>
+          <a:srcRect t="13261"/>
+          <a:stretch/>
+        </p:blipFill>
+        <p:spPr>
+          <a:xfrm>
+            <a:off x="591065" y="171628"/>
+            <a:ext cx="9763897" cy="6514743"/>
+          </a:xfrm>
+        </p:spPr>
+      </p:pic>
+    </p:spTree>
+    <p:extLst>
+      <p:ext uri="{BB962C8B-B14F-4D97-AF65-F5344CB8AC3E}">
+        <p14:creationId xmlns:p14="http://schemas.microsoft.com/office/powerpoint/2010/main" val="981457610"/>
+      </p:ext>
+    </p:extLst>
+  </p:cSld>
+  <p:clrMapOvr>
+    <a:masterClrMapping/>
+  </p:clrMapOvr>
+</p:sld>
+</file>
+
+<file path=ppt/slides/slide5.xml><?xml version="1.0" encoding="utf-8"?>
 <p:sld xmlns:a="http://schemas.openxmlformats.org/drawingml/2006/main" xmlns:r="http://schemas.openxmlformats.org/officeDocument/2006/relationships" xmlns:p="http://schemas.openxmlformats.org/presentationml/2006/main">
   <p:cSld>
     <p:spTree>
@@ -7076,133 +7494,6 @@
 </p:sld>
 </file>
 
-<file path=ppt/slides/slide5.xml><?xml version="1.0" encoding="utf-8"?>
-<p:sld xmlns:a="http://schemas.openxmlformats.org/drawingml/2006/main" xmlns:r="http://schemas.openxmlformats.org/officeDocument/2006/relationships" xmlns:p="http://schemas.openxmlformats.org/presentationml/2006/main">
-  <p:cSld>
-    <p:spTree>
-      <p:nvGrpSpPr>
-        <p:cNvPr id="1" name=""/>
-        <p:cNvGrpSpPr/>
-        <p:nvPr/>
-      </p:nvGrpSpPr>
-      <p:grpSpPr>
-        <a:xfrm>
-          <a:off x="0" y="0"/>
-          <a:ext cx="0" cy="0"/>
-          <a:chOff x="0" y="0"/>
-          <a:chExt cx="0" cy="0"/>
-        </a:xfrm>
-      </p:grpSpPr>
-      <p:pic>
-        <p:nvPicPr>
-          <p:cNvPr id="4" name="Picture" descr="Variation in total SC area per cell across strains and Relationship between total sc and mean MLH1 count per cell across male mice. A) Mean total SC area per mouse across subspecies and recombination groups. High- and low-recombining groups are indicated by 1 and 0 respectively. (Horizontal lines indicate strain averages for total SC area.)B) Mouse averaged rates of MLH1 and total SC per cell"/>
-          <p:cNvPicPr/>
-          <p:nvPr/>
-        </p:nvPicPr>
-        <p:blipFill>
-          <a:blip r:embed="rId3"/>
-          <a:stretch>
-            <a:fillRect/>
-          </a:stretch>
-        </p:blipFill>
-        <p:spPr bwMode="auto">
-          <a:xfrm>
-            <a:off x="645694" y="1376864"/>
-            <a:ext cx="8029074" cy="3189872"/>
-          </a:xfrm>
-          <a:prstGeom prst="rect">
-            <a:avLst/>
-          </a:prstGeom>
-          <a:noFill/>
-          <a:ln w="9525">
-            <a:noFill/>
-            <a:headEnd/>
-            <a:tailEnd/>
-          </a:ln>
-        </p:spPr>
-      </p:pic>
-      <p:pic>
-        <p:nvPicPr>
-          <p:cNvPr id="3" name="Picture 2"/>
-          <p:cNvPicPr>
-            <a:picLocks noChangeAspect="1"/>
-          </p:cNvPicPr>
-          <p:nvPr/>
-        </p:nvPicPr>
-        <p:blipFill rotWithShape="1">
-          <a:blip r:embed="rId4" cstate="print">
-            <a:extLst>
-              <a:ext uri="{28A0092B-C50C-407E-A947-70E740481C1C}">
-                <a14:useLocalDpi xmlns:a14="http://schemas.microsoft.com/office/drawing/2010/main" val="0"/>
-              </a:ext>
-            </a:extLst>
-          </a:blip>
-          <a:srcRect t="1390"/>
-          <a:stretch/>
-        </p:blipFill>
-        <p:spPr>
-          <a:xfrm>
-            <a:off x="9205380" y="571729"/>
-            <a:ext cx="1106206" cy="1038877"/>
-          </a:xfrm>
-          <a:prstGeom prst="rect">
-            <a:avLst/>
-          </a:prstGeom>
-          <a:ln>
-            <a:solidFill>
-              <a:schemeClr val="tx1"/>
-            </a:solidFill>
-          </a:ln>
-        </p:spPr>
-      </p:pic>
-      <p:pic>
-        <p:nvPicPr>
-          <p:cNvPr id="5" name="Picture 4"/>
-          <p:cNvPicPr>
-            <a:picLocks noChangeAspect="1"/>
-          </p:cNvPicPr>
-          <p:nvPr/>
-        </p:nvPicPr>
-        <p:blipFill>
-          <a:blip r:embed="rId5" cstate="print">
-            <a:extLst>
-              <a:ext uri="{28A0092B-C50C-407E-A947-70E740481C1C}">
-                <a14:useLocalDpi xmlns:a14="http://schemas.microsoft.com/office/drawing/2010/main" val="0"/>
-              </a:ext>
-            </a:extLst>
-          </a:blip>
-          <a:stretch>
-            <a:fillRect/>
-          </a:stretch>
-        </p:blipFill>
-        <p:spPr>
-          <a:xfrm>
-            <a:off x="9205380" y="1947535"/>
-            <a:ext cx="1106206" cy="1024265"/>
-          </a:xfrm>
-          <a:prstGeom prst="rect">
-            <a:avLst/>
-          </a:prstGeom>
-          <a:ln>
-            <a:solidFill>
-              <a:schemeClr val="tx1"/>
-            </a:solidFill>
-          </a:ln>
-        </p:spPr>
-      </p:pic>
-    </p:spTree>
-    <p:extLst>
-      <p:ext uri="{BB962C8B-B14F-4D97-AF65-F5344CB8AC3E}">
-        <p14:creationId xmlns:p14="http://schemas.microsoft.com/office/powerpoint/2010/main" val="1735693044"/>
-      </p:ext>
-    </p:extLst>
-  </p:cSld>
-  <p:clrMapOvr>
-    <a:masterClrMapping/>
-  </p:clrMapOvr>
-</p:sld>
-</file>
-
 <file path=ppt/slides/slide6.xml><?xml version="1.0" encoding="utf-8"?>
 <p:sld xmlns:a="http://schemas.openxmlformats.org/drawingml/2006/main" xmlns:r="http://schemas.openxmlformats.org/officeDocument/2006/relationships" xmlns:p="http://schemas.openxmlformats.org/presentationml/2006/main">
   <p:cSld>
@@ -18136,12 +18427,12 @@
           <a:graphicData uri="http://schemas.openxmlformats.org/presentationml/2006/ole">
             <mc:AlternateContent xmlns:mc="http://schemas.openxmlformats.org/markup-compatibility/2006">
               <mc:Choice xmlns:v="urn:schemas-microsoft-com:vml" Requires="v">
-                <p:oleObj spid="_x0000_s2062" name="Worksheet" r:id="rId4" imgW="6772228" imgH="1533552" progId="Excel.Sheet.12">
+                <p:oleObj spid="_x0000_s2065" name="Worksheet" r:id="rId5" imgW="6772228" imgH="1533552" progId="Excel.Sheet.12">
                   <p:embed/>
                 </p:oleObj>
               </mc:Choice>
               <mc:Fallback>
-                <p:oleObj name="Worksheet" r:id="rId4" imgW="6772228" imgH="1533552" progId="Excel.Sheet.12">
+                <p:oleObj name="Worksheet" r:id="rId5" imgW="6772228" imgH="1533552" progId="Excel.Sheet.12">
                   <p:embed/>
                   <p:pic>
                     <p:nvPicPr>
@@ -18150,7 +18441,7 @@
                       <p:nvPr/>
                     </p:nvPicPr>
                     <p:blipFill>
-                      <a:blip r:embed="rId5"/>
+                      <a:blip r:embed="rId6"/>
                       <a:stretch>
                         <a:fillRect/>
                       </a:stretch>
@@ -18175,6 +18466,133 @@
     <p:extLst>
       <p:ext uri="{BB962C8B-B14F-4D97-AF65-F5344CB8AC3E}">
         <p14:creationId xmlns:p14="http://schemas.microsoft.com/office/powerpoint/2010/main" val="2677594335"/>
+      </p:ext>
+    </p:extLst>
+  </p:cSld>
+  <p:clrMapOvr>
+    <a:masterClrMapping/>
+  </p:clrMapOvr>
+</p:sld>
+</file>
+
+<file path=ppt/slides/slide9.xml><?xml version="1.0" encoding="utf-8"?>
+<p:sld xmlns:a="http://schemas.openxmlformats.org/drawingml/2006/main" xmlns:r="http://schemas.openxmlformats.org/officeDocument/2006/relationships" xmlns:p="http://schemas.openxmlformats.org/presentationml/2006/main">
+  <p:cSld>
+    <p:spTree>
+      <p:nvGrpSpPr>
+        <p:cNvPr id="1" name=""/>
+        <p:cNvGrpSpPr/>
+        <p:nvPr/>
+      </p:nvGrpSpPr>
+      <p:grpSpPr>
+        <a:xfrm>
+          <a:off x="0" y="0"/>
+          <a:ext cx="0" cy="0"/>
+          <a:chOff x="0" y="0"/>
+          <a:chExt cx="0" cy="0"/>
+        </a:xfrm>
+      </p:grpSpPr>
+      <p:pic>
+        <p:nvPicPr>
+          <p:cNvPr id="4" name="Picture" descr="Variation in total SC area per cell across strains and Relationship between total sc and mean MLH1 count per cell across male mice. A) Mean total SC area per mouse across subspecies and recombination groups. High- and low-recombining groups are indicated by 1 and 0 respectively. (Horizontal lines indicate strain averages for total SC area.)B) Mouse averaged rates of MLH1 and total SC per cell"/>
+          <p:cNvPicPr/>
+          <p:nvPr/>
+        </p:nvPicPr>
+        <p:blipFill>
+          <a:blip r:embed="rId3"/>
+          <a:stretch>
+            <a:fillRect/>
+          </a:stretch>
+        </p:blipFill>
+        <p:spPr bwMode="auto">
+          <a:xfrm>
+            <a:off x="645694" y="1376864"/>
+            <a:ext cx="8029074" cy="3189872"/>
+          </a:xfrm>
+          <a:prstGeom prst="rect">
+            <a:avLst/>
+          </a:prstGeom>
+          <a:noFill/>
+          <a:ln w="9525">
+            <a:noFill/>
+            <a:headEnd/>
+            <a:tailEnd/>
+          </a:ln>
+        </p:spPr>
+      </p:pic>
+      <p:pic>
+        <p:nvPicPr>
+          <p:cNvPr id="3" name="Picture 2"/>
+          <p:cNvPicPr>
+            <a:picLocks noChangeAspect="1"/>
+          </p:cNvPicPr>
+          <p:nvPr/>
+        </p:nvPicPr>
+        <p:blipFill rotWithShape="1">
+          <a:blip r:embed="rId4" cstate="print">
+            <a:extLst>
+              <a:ext uri="{28A0092B-C50C-407E-A947-70E740481C1C}">
+                <a14:useLocalDpi xmlns:a14="http://schemas.microsoft.com/office/drawing/2010/main" val="0"/>
+              </a:ext>
+            </a:extLst>
+          </a:blip>
+          <a:srcRect t="1390"/>
+          <a:stretch/>
+        </p:blipFill>
+        <p:spPr>
+          <a:xfrm>
+            <a:off x="9205380" y="571729"/>
+            <a:ext cx="1106206" cy="1038877"/>
+          </a:xfrm>
+          <a:prstGeom prst="rect">
+            <a:avLst/>
+          </a:prstGeom>
+          <a:ln>
+            <a:solidFill>
+              <a:schemeClr val="tx1"/>
+            </a:solidFill>
+          </a:ln>
+        </p:spPr>
+      </p:pic>
+      <p:pic>
+        <p:nvPicPr>
+          <p:cNvPr id="5" name="Picture 4"/>
+          <p:cNvPicPr>
+            <a:picLocks noChangeAspect="1"/>
+          </p:cNvPicPr>
+          <p:nvPr/>
+        </p:nvPicPr>
+        <p:blipFill>
+          <a:blip r:embed="rId5" cstate="print">
+            <a:extLst>
+              <a:ext uri="{28A0092B-C50C-407E-A947-70E740481C1C}">
+                <a14:useLocalDpi xmlns:a14="http://schemas.microsoft.com/office/drawing/2010/main" val="0"/>
+              </a:ext>
+            </a:extLst>
+          </a:blip>
+          <a:stretch>
+            <a:fillRect/>
+          </a:stretch>
+        </p:blipFill>
+        <p:spPr>
+          <a:xfrm>
+            <a:off x="9205380" y="1947535"/>
+            <a:ext cx="1106206" cy="1024265"/>
+          </a:xfrm>
+          <a:prstGeom prst="rect">
+            <a:avLst/>
+          </a:prstGeom>
+          <a:ln>
+            <a:solidFill>
+              <a:schemeClr val="tx1"/>
+            </a:solidFill>
+          </a:ln>
+        </p:spPr>
+      </p:pic>
+    </p:spTree>
+    <p:extLst>
+      <p:ext uri="{BB962C8B-B14F-4D97-AF65-F5344CB8AC3E}">
+        <p14:creationId xmlns:p14="http://schemas.microsoft.com/office/powerpoint/2010/main" val="1735693044"/>
       </p:ext>
     </p:extLst>
   </p:cSld>

</xml_diff>